<commit_message>
Clean up whitespace, start rewiewing content.
</commit_message>
<xml_diff>
--- a/Broala-Bro_Log_Cheatsheet-v2.pptx
+++ b/Broala-Bro_Log_Cheatsheet-v2.pptx
@@ -292,7 +292,7 @@
             <a:fld id="{5C45C691-319C-4B9F-941C-73BDCD6FFE18}" type="datetimeFigureOut">
               <a:rPr lang="en-US" smtClean="0"/>
               <a:pPr/>
-              <a:t>8/8/14</a:t>
+              <a:t>8/11/14</a:t>
             </a:fld>
             <a:endParaRPr lang="en-US" dirty="0"/>
           </a:p>
@@ -459,7 +459,7 @@
             <a:fld id="{5C45C691-319C-4B9F-941C-73BDCD6FFE18}" type="datetimeFigureOut">
               <a:rPr lang="en-US" smtClean="0"/>
               <a:pPr/>
-              <a:t>8/8/14</a:t>
+              <a:t>8/11/14</a:t>
             </a:fld>
             <a:endParaRPr lang="en-US" dirty="0"/>
           </a:p>
@@ -636,7 +636,7 @@
             <a:fld id="{5C45C691-319C-4B9F-941C-73BDCD6FFE18}" type="datetimeFigureOut">
               <a:rPr lang="en-US" smtClean="0"/>
               <a:pPr/>
-              <a:t>8/8/14</a:t>
+              <a:t>8/11/14</a:t>
             </a:fld>
             <a:endParaRPr lang="en-US" dirty="0"/>
           </a:p>
@@ -803,7 +803,7 @@
             <a:fld id="{5C45C691-319C-4B9F-941C-73BDCD6FFE18}" type="datetimeFigureOut">
               <a:rPr lang="en-US" smtClean="0"/>
               <a:pPr/>
-              <a:t>8/8/14</a:t>
+              <a:t>8/11/14</a:t>
             </a:fld>
             <a:endParaRPr lang="en-US" dirty="0"/>
           </a:p>
@@ -1046,7 +1046,7 @@
             <a:fld id="{5C45C691-319C-4B9F-941C-73BDCD6FFE18}" type="datetimeFigureOut">
               <a:rPr lang="en-US" smtClean="0"/>
               <a:pPr/>
-              <a:t>8/8/14</a:t>
+              <a:t>8/11/14</a:t>
             </a:fld>
             <a:endParaRPr lang="en-US" dirty="0"/>
           </a:p>
@@ -1331,7 +1331,7 @@
             <a:fld id="{5C45C691-319C-4B9F-941C-73BDCD6FFE18}" type="datetimeFigureOut">
               <a:rPr lang="en-US" smtClean="0"/>
               <a:pPr/>
-              <a:t>8/8/14</a:t>
+              <a:t>8/11/14</a:t>
             </a:fld>
             <a:endParaRPr lang="en-US" dirty="0"/>
           </a:p>
@@ -1750,7 +1750,7 @@
             <a:fld id="{5C45C691-319C-4B9F-941C-73BDCD6FFE18}" type="datetimeFigureOut">
               <a:rPr lang="en-US" smtClean="0"/>
               <a:pPr/>
-              <a:t>8/8/14</a:t>
+              <a:t>8/11/14</a:t>
             </a:fld>
             <a:endParaRPr lang="en-US" dirty="0"/>
           </a:p>
@@ -1865,7 +1865,7 @@
             <a:fld id="{5C45C691-319C-4B9F-941C-73BDCD6FFE18}" type="datetimeFigureOut">
               <a:rPr lang="en-US" smtClean="0"/>
               <a:pPr/>
-              <a:t>8/8/14</a:t>
+              <a:t>8/11/14</a:t>
             </a:fld>
             <a:endParaRPr lang="en-US" dirty="0"/>
           </a:p>
@@ -1957,7 +1957,7 @@
             <a:fld id="{5C45C691-319C-4B9F-941C-73BDCD6FFE18}" type="datetimeFigureOut">
               <a:rPr lang="en-US" smtClean="0"/>
               <a:pPr/>
-              <a:t>8/8/14</a:t>
+              <a:t>8/11/14</a:t>
             </a:fld>
             <a:endParaRPr lang="en-US" dirty="0"/>
           </a:p>
@@ -2231,7 +2231,7 @@
             <a:fld id="{5C45C691-319C-4B9F-941C-73BDCD6FFE18}" type="datetimeFigureOut">
               <a:rPr lang="en-US" smtClean="0"/>
               <a:pPr/>
-              <a:t>8/8/14</a:t>
+              <a:t>8/11/14</a:t>
             </a:fld>
             <a:endParaRPr lang="en-US" dirty="0"/>
           </a:p>
@@ -2481,7 +2481,7 @@
             <a:fld id="{5C45C691-319C-4B9F-941C-73BDCD6FFE18}" type="datetimeFigureOut">
               <a:rPr lang="en-US" smtClean="0"/>
               <a:pPr/>
-              <a:t>8/8/14</a:t>
+              <a:t>8/11/14</a:t>
             </a:fld>
             <a:endParaRPr lang="en-US" dirty="0"/>
           </a:p>
@@ -2691,7 +2691,7 @@
             <a:fld id="{5C45C691-319C-4B9F-941C-73BDCD6FFE18}" type="datetimeFigureOut">
               <a:rPr lang="en-US" smtClean="0"/>
               <a:pPr/>
-              <a:t>8/8/14</a:t>
+              <a:t>8/11/14</a:t>
             </a:fld>
             <a:endParaRPr lang="en-US" dirty="0"/>
           </a:p>
@@ -3070,17 +3070,17 @@
         </p:nvSpPr>
         <p:spPr>
           <a:xfrm>
-            <a:off x="4191000" y="7772400"/>
+            <a:off x="4091870" y="3959598"/>
             <a:ext cx="2209800" cy="1600200"/>
           </a:xfrm>
           <a:prstGeom prst="borderCallout2">
             <a:avLst>
               <a:gd name="adj1" fmla="val 49540"/>
               <a:gd name="adj2" fmla="val -125"/>
-              <a:gd name="adj3" fmla="val 26330"/>
-              <a:gd name="adj4" fmla="val -13377"/>
-              <a:gd name="adj5" fmla="val 26365"/>
-              <a:gd name="adj6" fmla="val -17547"/>
+              <a:gd name="adj3" fmla="val -20648"/>
+              <a:gd name="adj4" fmla="val -8423"/>
+              <a:gd name="adj5" fmla="val -21069"/>
+              <a:gd name="adj6" fmla="val -16886"/>
             </a:avLst>
           </a:prstGeom>
         </p:spPr>
@@ -3115,17 +3115,17 @@
         </p:nvSpPr>
         <p:spPr>
           <a:xfrm>
-            <a:off x="4065252" y="4803402"/>
+            <a:off x="4065252" y="990600"/>
             <a:ext cx="2945148" cy="2335896"/>
           </a:xfrm>
           <a:prstGeom prst="borderCallout2">
             <a:avLst>
               <a:gd name="adj1" fmla="val 49540"/>
               <a:gd name="adj2" fmla="val -125"/>
-              <a:gd name="adj3" fmla="val 120023"/>
+              <a:gd name="adj3" fmla="val 86591"/>
               <a:gd name="adj4" fmla="val -5543"/>
-              <a:gd name="adj5" fmla="val 120108"/>
-              <a:gd name="adj6" fmla="val -8851"/>
+              <a:gd name="adj5" fmla="val 86676"/>
+              <a:gd name="adj6" fmla="val -9594"/>
             </a:avLst>
           </a:prstGeom>
         </p:spPr>
@@ -3161,13 +3161,13 @@
           <p:nvPr>
             <p:extLst>
               <p:ext uri="{D42A27DB-BD31-4B8C-83A1-F6EECF244321}">
-                <p14:modId xmlns:p14="http://schemas.microsoft.com/office/powerpoint/2010/main" val="816935253"/>
+                <p14:modId xmlns:p14="http://schemas.microsoft.com/office/powerpoint/2010/main" val="3332477223"/>
               </p:ext>
             </p:extLst>
           </p:nvPr>
         </p:nvGraphicFramePr>
         <p:xfrm>
-          <a:off x="4156392" y="4843447"/>
+          <a:off x="4156392" y="1030645"/>
           <a:ext cx="2777808" cy="2245848"/>
         </p:xfrm>
         <a:graphic>
@@ -3804,7 +3804,7 @@
         </p:nvSpPr>
         <p:spPr>
           <a:xfrm>
-            <a:off x="3955565" y="4495800"/>
+            <a:off x="3955565" y="609600"/>
             <a:ext cx="2216635" cy="307777"/>
           </a:xfrm>
           <a:prstGeom prst="rect">
@@ -3875,14 +3875,14 @@
           <p:nvPr>
             <p:extLst>
               <p:ext uri="{D42A27DB-BD31-4B8C-83A1-F6EECF244321}">
-                <p14:modId xmlns:p14="http://schemas.microsoft.com/office/powerpoint/2010/main" val="809939154"/>
+                <p14:modId xmlns:p14="http://schemas.microsoft.com/office/powerpoint/2010/main" val="2778242277"/>
               </p:ext>
             </p:extLst>
           </p:nvPr>
         </p:nvGraphicFramePr>
         <p:xfrm>
-          <a:off x="152400" y="2305176"/>
-          <a:ext cx="2971800" cy="1142997"/>
+          <a:off x="4130466" y="5978158"/>
+          <a:ext cx="2879933" cy="1454280"/>
         </p:xfrm>
         <a:graphic>
           <a:graphicData uri="http://schemas.openxmlformats.org/drawingml/2006/table">
@@ -3891,9 +3891,9 @@
                 <a:tableStyleId>{5C22544A-7EE6-4342-B048-85BDC9FD1C3A}</a:tableStyleId>
               </a:tblPr>
               <a:tblGrid>
-                <a:gridCol w="615632"/>
-                <a:gridCol w="381000"/>
-                <a:gridCol w="1975168"/>
+                <a:gridCol w="639985"/>
+                <a:gridCol w="399991"/>
+                <a:gridCol w="1839957"/>
               </a:tblGrid>
               <a:tr h="192795">
                 <a:tc>
@@ -4254,7 +4254,7 @@
         </p:nvSpPr>
         <p:spPr>
           <a:xfrm>
-            <a:off x="60533" y="1889618"/>
+            <a:off x="4038600" y="5562600"/>
             <a:ext cx="1843398" cy="461665"/>
           </a:xfrm>
           <a:prstGeom prst="rect">
@@ -4324,14 +4324,14 @@
           <p:nvPr>
             <p:extLst>
               <p:ext uri="{D42A27DB-BD31-4B8C-83A1-F6EECF244321}">
-                <p14:modId xmlns:p14="http://schemas.microsoft.com/office/powerpoint/2010/main" val="2050971596"/>
+                <p14:modId xmlns:p14="http://schemas.microsoft.com/office/powerpoint/2010/main" val="2416641657"/>
               </p:ext>
             </p:extLst>
           </p:nvPr>
         </p:nvGraphicFramePr>
         <p:xfrm>
-          <a:off x="3256280" y="832230"/>
-          <a:ext cx="3886544" cy="3464890"/>
+          <a:off x="152400" y="5334004"/>
+          <a:ext cx="3657600" cy="3733796"/>
         </p:xfrm>
         <a:graphic>
           <a:graphicData uri="http://schemas.openxmlformats.org/drawingml/2006/table">
@@ -4340,11 +4340,11 @@
                 <a:tableStyleId>{21E4AEA4-8DFA-4A89-87EB-49C32662AFE0}</a:tableStyleId>
               </a:tblPr>
               <a:tblGrid>
-                <a:gridCol w="706120"/>
-                <a:gridCol w="304800"/>
-                <a:gridCol w="2875624"/>
+                <a:gridCol w="664525"/>
+                <a:gridCol w="367912"/>
+                <a:gridCol w="2625163"/>
               </a:tblGrid>
-              <a:tr h="190499">
+              <a:tr h="199523">
                 <a:tc>
                   <a:txBody>
                     <a:bodyPr/>
@@ -4388,7 +4388,7 @@
                   <a:tcPr marL="27432" marR="9144" marT="18288" marB="0"/>
                 </a:tc>
               </a:tr>
-              <a:tr h="162090">
+              <a:tr h="169768">
                 <a:tc>
                   <a:txBody>
                     <a:bodyPr/>
@@ -4432,7 +4432,7 @@
                   <a:tcPr marL="27432" marR="9144" marT="18288" marB="0"/>
                 </a:tc>
               </a:tr>
-              <a:tr h="177109">
+              <a:tr h="185499">
                 <a:tc>
                   <a:txBody>
                     <a:bodyPr/>
@@ -4501,7 +4501,7 @@
                   <a:tcPr marL="27432" marR="18288" marT="18288" marB="0"/>
                 </a:tc>
               </a:tr>
-              <a:tr h="177109">
+              <a:tr h="185499">
                 <a:tc>
                   <a:txBody>
                     <a:bodyPr/>
@@ -4565,7 +4565,7 @@
                   <a:tcPr marL="27432" marR="9144" marT="18288" marB="0"/>
                 </a:tc>
               </a:tr>
-              <a:tr h="164643">
+              <a:tr h="172442">
                 <a:tc>
                   <a:txBody>
                     <a:bodyPr/>
@@ -4625,7 +4625,7 @@
                   <a:tcPr marL="27432" marR="9144" marT="18288" marB="0"/>
                 </a:tc>
               </a:tr>
-              <a:tr h="162090">
+              <a:tr h="169768">
                 <a:tc>
                   <a:txBody>
                     <a:bodyPr/>
@@ -4669,7 +4669,7 @@
                   <a:tcPr marL="27432" marR="9144" marT="18288" marB="0"/>
                 </a:tc>
               </a:tr>
-              <a:tr h="162090">
+              <a:tr h="169768">
                 <a:tc>
                   <a:txBody>
                     <a:bodyPr/>
@@ -4713,7 +4713,7 @@
                   <a:tcPr marL="27432" marR="9144" marT="18288" marB="0"/>
                 </a:tc>
               </a:tr>
-              <a:tr h="162090">
+              <a:tr h="169768">
                 <a:tc>
                   <a:txBody>
                     <a:bodyPr/>
@@ -4761,7 +4761,7 @@
                   <a:tcPr marL="27432" marR="9144" marT="18288" marB="0"/>
                 </a:tc>
               </a:tr>
-              <a:tr h="162090">
+              <a:tr h="169768">
                 <a:tc>
                   <a:txBody>
                     <a:bodyPr/>
@@ -4805,7 +4805,7 @@
                   <a:tcPr marL="27432" marR="9144" marT="18288" marB="0"/>
                 </a:tc>
               </a:tr>
-              <a:tr h="162090">
+              <a:tr h="169768">
                 <a:tc>
                   <a:txBody>
                     <a:bodyPr/>
@@ -4849,7 +4849,7 @@
                   <a:tcPr marL="27432" marR="9144" marT="18288" marB="0"/>
                 </a:tc>
               </a:tr>
-              <a:tr h="162090">
+              <a:tr h="169768">
                 <a:tc>
                   <a:txBody>
                     <a:bodyPr/>
@@ -4893,7 +4893,7 @@
                   <a:tcPr marL="27432" marR="9144" marT="18288" marB="0"/>
                 </a:tc>
               </a:tr>
-              <a:tr h="162090">
+              <a:tr h="274545">
                 <a:tc>
                   <a:txBody>
                     <a:bodyPr/>
@@ -4958,7 +4958,7 @@
                   <a:tcPr marL="27432" marR="9144" marT="18288" marB="0"/>
                 </a:tc>
               </a:tr>
-              <a:tr h="162090">
+              <a:tr h="169768">
                 <a:tc>
                   <a:txBody>
                     <a:bodyPr/>
@@ -5032,7 +5032,19 @@
                       </a:r>
                       <a:r>
                         <a:rPr lang="en-US" sz="800" baseline="0" dirty="0" smtClean="0"/>
-                        <a:t> this a query or a response? T = response, F = query</a:t>
+                        <a:t> this a query </a:t>
+                      </a:r>
+                      <a:r>
+                        <a:rPr lang="en-US" sz="800" baseline="0" dirty="0" smtClean="0"/>
+                        <a:t>(T) or </a:t>
+                      </a:r>
+                      <a:r>
+                        <a:rPr lang="en-US" sz="800" baseline="0" dirty="0" smtClean="0"/>
+                        <a:t>a </a:t>
+                      </a:r>
+                      <a:r>
+                        <a:rPr lang="en-US" sz="800" baseline="0" dirty="0" smtClean="0"/>
+                        <a:t>response (F)?</a:t>
                       </a:r>
                       <a:endParaRPr lang="en-US" sz="800" dirty="0" smtClean="0"/>
                     </a:p>
@@ -5040,7 +5052,7 @@
                   <a:tcPr marL="27432" marR="9144" marT="18288" marB="0"/>
                 </a:tc>
               </a:tr>
-              <a:tr h="162090">
+              <a:tr h="169768">
                 <a:tc>
                   <a:txBody>
                     <a:bodyPr/>
@@ -5110,11 +5122,11 @@
                       </a:pPr>
                       <a:r>
                         <a:rPr lang="en-US" sz="800" dirty="0" smtClean="0"/>
-                        <a:t>Authoritative Answer. T</a:t>
+                        <a:t>T</a:t>
                       </a:r>
                       <a:r>
                         <a:rPr lang="en-US" sz="800" baseline="0" dirty="0" smtClean="0"/>
-                        <a:t> = </a:t>
+                        <a:t>: </a:t>
                       </a:r>
                       <a:r>
                         <a:rPr lang="en-US" sz="800" dirty="0" smtClean="0"/>
@@ -5130,7 +5142,7 @@
                   <a:tcPr marL="27432" marR="9144" marT="18288" marB="0"/>
                 </a:tc>
               </a:tr>
-              <a:tr h="162090">
+              <a:tr h="169768">
                 <a:tc>
                   <a:txBody>
                     <a:bodyPr/>
@@ -5166,11 +5178,15 @@
                     <a:p>
                       <a:r>
                         <a:rPr lang="en-US" sz="800" dirty="0" smtClean="0"/>
-                        <a:t>Truncation. T</a:t>
+                        <a:t>T:</a:t>
                       </a:r>
                       <a:r>
                         <a:rPr lang="en-US" sz="800" baseline="0" dirty="0" smtClean="0"/>
-                        <a:t> = message was truncated</a:t>
+                        <a:t> </a:t>
+                      </a:r>
+                      <a:r>
+                        <a:rPr lang="en-US" sz="800" baseline="0" dirty="0" smtClean="0"/>
+                        <a:t>message was truncated</a:t>
                       </a:r>
                       <a:endParaRPr lang="en-US" sz="800" dirty="0"/>
                     </a:p>
@@ -5178,7 +5194,7 @@
                   <a:tcPr marL="27432" marR="9144" marT="18288" marB="0"/>
                 </a:tc>
               </a:tr>
-              <a:tr h="162090">
+              <a:tr h="169768">
                 <a:tc>
                   <a:txBody>
                     <a:bodyPr/>
@@ -5238,7 +5254,7 @@
                   <a:tcPr marL="27432" marR="9144" marT="18288" marB="0"/>
                 </a:tc>
               </a:tr>
-              <a:tr h="162090">
+              <a:tr h="169768">
                 <a:tc>
                   <a:txBody>
                     <a:bodyPr/>
@@ -5290,7 +5306,7 @@
                   <a:tcPr marL="27432" marR="9144" marT="18288" marB="0"/>
                 </a:tc>
               </a:tr>
-              <a:tr h="162090">
+              <a:tr h="169768">
                 <a:tc>
                   <a:txBody>
                     <a:bodyPr/>
@@ -5334,7 +5350,7 @@
                   <a:tcPr marL="27432" marR="9144" marT="18288" marB="0"/>
                 </a:tc>
               </a:tr>
-              <a:tr h="162090">
+              <a:tr h="169768">
                 <a:tc>
                   <a:txBody>
                     <a:bodyPr/>
@@ -5378,7 +5394,7 @@
                   <a:tcPr marL="27432" marR="9144" marT="18288" marB="0"/>
                 </a:tc>
               </a:tr>
-              <a:tr h="162090">
+              <a:tr h="169768">
                 <a:tc>
                   <a:txBody>
                     <a:bodyPr/>
@@ -5422,7 +5438,7 @@
                   <a:tcPr marL="27432" marR="9144" marT="18288" marB="0"/>
                 </a:tc>
               </a:tr>
-              <a:tr h="162090">
+              <a:tr h="169768">
                 <a:tc>
                   <a:txBody>
                     <a:bodyPr/>
@@ -5482,7 +5498,7 @@
         </p:nvSpPr>
         <p:spPr>
           <a:xfrm>
-            <a:off x="3159968" y="372030"/>
+            <a:off x="76200" y="4882774"/>
             <a:ext cx="2124926" cy="461665"/>
           </a:xfrm>
           <a:prstGeom prst="rect">
@@ -5552,14 +5568,14 @@
           <p:nvPr>
             <p:extLst>
               <p:ext uri="{D42A27DB-BD31-4B8C-83A1-F6EECF244321}">
-                <p14:modId xmlns:p14="http://schemas.microsoft.com/office/powerpoint/2010/main" val="1640978784"/>
+                <p14:modId xmlns:p14="http://schemas.microsoft.com/office/powerpoint/2010/main" val="1133160237"/>
               </p:ext>
             </p:extLst>
           </p:nvPr>
         </p:nvGraphicFramePr>
         <p:xfrm>
-          <a:off x="152401" y="5501613"/>
-          <a:ext cx="3657599" cy="3870987"/>
+          <a:off x="152401" y="929613"/>
+          <a:ext cx="3657599" cy="3918528"/>
         </p:xfrm>
         <a:graphic>
           <a:graphicData uri="http://schemas.openxmlformats.org/drawingml/2006/table">
@@ -6031,12 +6047,12 @@
                     <a:lstStyle/>
                     <a:p>
                       <a:r>
-                        <a:rPr lang="en-US" sz="800" b="0" dirty="0" err="1" smtClean="0">
+                        <a:rPr lang="en-US" sz="800" b="0" dirty="0" smtClean="0">
                           <a:solidFill>
                             <a:schemeClr val="tx1"/>
                           </a:solidFill>
                         </a:rPr>
-                        <a:t>transport_proto</a:t>
+                        <a:t>proto</a:t>
                       </a:r>
                       <a:endParaRPr lang="en-US" sz="800" b="0" dirty="0">
                         <a:solidFill>
@@ -6436,12 +6452,28 @@
                         <a:t> state (see </a:t>
                       </a:r>
                       <a:r>
+                        <a:rPr lang="en-US" sz="800" b="1" baseline="0" dirty="0" smtClean="0">
+                          <a:solidFill>
+                            <a:srgbClr val="4FADC4"/>
+                          </a:solidFill>
+                        </a:rPr>
+                        <a:t>conn.log</a:t>
+                      </a:r>
+                      <a:r>
+                        <a:rPr lang="en-US" sz="800" b="1" baseline="0" dirty="0" smtClean="0">
+                          <a:solidFill>
+                            <a:srgbClr val="4FADC4"/>
+                          </a:solidFill>
+                        </a:rPr>
+                        <a:t>: </a:t>
+                      </a:r>
+                      <a:r>
                         <a:rPr lang="en-US" sz="800" b="1" baseline="0" dirty="0" err="1" smtClean="0">
                           <a:solidFill>
                             <a:srgbClr val="4FADC4"/>
                           </a:solidFill>
                         </a:rPr>
-                        <a:t>conn.log:conn_state</a:t>
+                        <a:t>conn_state</a:t>
                       </a:r>
                       <a:r>
                         <a:rPr lang="en-US" sz="800" baseline="0" dirty="0" smtClean="0">
@@ -6717,12 +6749,20 @@
                         <a:t> state history (see </a:t>
                       </a:r>
                       <a:r>
-                        <a:rPr lang="en-US" sz="800" b="1" baseline="0" dirty="0" err="1" smtClean="0">
+                        <a:rPr lang="en-US" sz="800" b="1" baseline="0" dirty="0" smtClean="0">
                           <a:solidFill>
                             <a:srgbClr val="4FADC4"/>
                           </a:solidFill>
                         </a:rPr>
-                        <a:t>conn.log:history</a:t>
+                        <a:t>conn.log</a:t>
+                      </a:r>
+                      <a:r>
+                        <a:rPr lang="en-US" sz="800" b="1" baseline="0" dirty="0" smtClean="0">
+                          <a:solidFill>
+                            <a:srgbClr val="4FADC4"/>
+                          </a:solidFill>
+                        </a:rPr>
+                        <a:t>: history</a:t>
                       </a:r>
                       <a:r>
                         <a:rPr lang="en-US" sz="800" b="0" baseline="0" dirty="0" smtClean="0">
@@ -7233,7 +7273,7 @@
                   <a:tcPr marL="27432" marR="18288" marT="18288" marB="0"/>
                 </a:tc>
               </a:tr>
-              <a:tr h="157269">
+              <a:tr h="309669">
                 <a:tc>
                   <a:txBody>
                     <a:bodyPr/>
@@ -7321,7 +7361,7 @@
         </p:nvSpPr>
         <p:spPr>
           <a:xfrm>
-            <a:off x="65648" y="5089233"/>
+            <a:off x="65648" y="517233"/>
             <a:ext cx="3126615" cy="461665"/>
           </a:xfrm>
           <a:prstGeom prst="rect">
@@ -7415,13 +7455,13 @@
           <p:nvPr>
             <p:extLst>
               <p:ext uri="{D42A27DB-BD31-4B8C-83A1-F6EECF244321}">
-                <p14:modId xmlns:p14="http://schemas.microsoft.com/office/powerpoint/2010/main" val="1264568229"/>
+                <p14:modId xmlns:p14="http://schemas.microsoft.com/office/powerpoint/2010/main" val="1695182900"/>
               </p:ext>
             </p:extLst>
           </p:nvPr>
         </p:nvGraphicFramePr>
         <p:xfrm>
-          <a:off x="4288317" y="7859307"/>
+          <a:off x="4189187" y="4046505"/>
           <a:ext cx="2036283" cy="1459503"/>
         </p:xfrm>
         <a:graphic>
@@ -7812,7 +7852,7 @@
         </p:nvSpPr>
         <p:spPr>
           <a:xfrm>
-            <a:off x="4061530" y="7315200"/>
+            <a:off x="3962400" y="3429000"/>
             <a:ext cx="3184097" cy="461665"/>
           </a:xfrm>
           <a:prstGeom prst="rect">
@@ -7937,9 +7977,7 @@
             <a:r>
               <a:rPr lang="en-US" sz="2400" dirty="0" smtClean="0">
                 <a:solidFill>
-                  <a:schemeClr val="bg1">
-                    <a:lumMod val="75000"/>
-                  </a:schemeClr>
+                  <a:srgbClr val="006699"/>
                 </a:solidFill>
                 <a:latin typeface="Arial Black" pitchFamily="34" charset="0"/>
               </a:rPr>
@@ -7947,9 +7985,7 @@
             </a:r>
             <a:endParaRPr lang="en-US" sz="2400" dirty="0">
               <a:solidFill>
-                <a:schemeClr val="bg1">
-                  <a:lumMod val="75000"/>
-                </a:schemeClr>
+                <a:srgbClr val="006699"/>
               </a:solidFill>
               <a:latin typeface="Arial Black" pitchFamily="34" charset="0"/>
             </a:endParaRPr>
@@ -7995,14 +8031,14 @@
           <p:nvPr>
             <p:extLst>
               <p:ext uri="{D42A27DB-BD31-4B8C-83A1-F6EECF244321}">
-                <p14:modId xmlns:p14="http://schemas.microsoft.com/office/powerpoint/2010/main" val="470205350"/>
+                <p14:modId xmlns:p14="http://schemas.microsoft.com/office/powerpoint/2010/main" val="4052353619"/>
               </p:ext>
             </p:extLst>
           </p:nvPr>
         </p:nvGraphicFramePr>
         <p:xfrm>
-          <a:off x="158433" y="3844728"/>
-          <a:ext cx="3013392" cy="1095839"/>
+          <a:off x="4136500" y="7819561"/>
+          <a:ext cx="2873900" cy="1207324"/>
         </p:xfrm>
         <a:graphic>
           <a:graphicData uri="http://schemas.openxmlformats.org/drawingml/2006/table">
@@ -8011,9 +8047,9 @@
                 <a:tableStyleId>{00A15C55-8517-42AA-B614-E9B94910E393}</a:tableStyleId>
               </a:tblPr>
               <a:tblGrid>
-                <a:gridCol w="546195"/>
-                <a:gridCol w="363059"/>
-                <a:gridCol w="2104138"/>
+                <a:gridCol w="651865"/>
+                <a:gridCol w="411488"/>
+                <a:gridCol w="1810547"/>
               </a:tblGrid>
               <a:tr h="191981">
                 <a:tc>
@@ -8180,19 +8216,7 @@
                       </a:pPr>
                       <a:r>
                         <a:rPr lang="en-US" sz="800" baseline="0" dirty="0" smtClean="0"/>
-                        <a:t>Underlying </a:t>
-                      </a:r>
-                      <a:r>
-                        <a:rPr lang="en-US" sz="800" baseline="0" dirty="0" smtClean="0"/>
-                        <a:t>connection </a:t>
-                      </a:r>
-                      <a:r>
-                        <a:rPr lang="en-US" sz="800" baseline="0" dirty="0" smtClean="0"/>
-                        <a:t>info - </a:t>
-                      </a:r>
-                      <a:r>
-                        <a:rPr lang="en-US" sz="800" baseline="0" dirty="0" smtClean="0"/>
-                        <a:t>See </a:t>
+                        <a:t>Underlying connection info - See </a:t>
                       </a:r>
                       <a:r>
                         <a:rPr lang="en-US" sz="800" b="1" baseline="0" dirty="0" smtClean="0">
@@ -8460,7 +8484,7 @@
         </p:nvSpPr>
         <p:spPr>
           <a:xfrm>
-            <a:off x="60533" y="3433343"/>
+            <a:off x="4038600" y="7408176"/>
             <a:ext cx="1573768" cy="461665"/>
           </a:xfrm>
           <a:prstGeom prst="rect">
@@ -8545,11 +8569,7 @@
           <a:p>
             <a:r>
               <a:rPr lang="en-US" sz="800" dirty="0" smtClean="0"/>
-              <a:t>Version: </a:t>
-            </a:r>
-            <a:r>
-              <a:rPr lang="en-US" sz="800" dirty="0" smtClean="0"/>
-              <a:t>2.0</a:t>
+              <a:t>Version: 2.0</a:t>
             </a:r>
             <a:endParaRPr lang="en-US" sz="800" dirty="0"/>
           </a:p>
@@ -8656,11 +8676,7 @@
             </a:r>
             <a:r>
               <a:rPr lang="en-US" sz="800" dirty="0" smtClean="0"/>
-              <a:t> LLC</a:t>
-            </a:r>
-            <a:r>
-              <a:rPr lang="en-US" sz="800" dirty="0" smtClean="0"/>
-              <a:t>. </a:t>
+              <a:t> LLC. </a:t>
             </a:r>
             <a:endParaRPr lang="en-US" sz="800" dirty="0"/>
           </a:p>
@@ -8700,14 +8716,14 @@
           <p:nvPr>
             <p:extLst>
               <p:ext uri="{D42A27DB-BD31-4B8C-83A1-F6EECF244321}">
-                <p14:modId xmlns:p14="http://schemas.microsoft.com/office/powerpoint/2010/main" val="1646515226"/>
+                <p14:modId xmlns:p14="http://schemas.microsoft.com/office/powerpoint/2010/main" val="1309899310"/>
               </p:ext>
             </p:extLst>
           </p:nvPr>
         </p:nvGraphicFramePr>
         <p:xfrm>
-          <a:off x="152400" y="2486860"/>
-          <a:ext cx="3581401" cy="4255074"/>
+          <a:off x="152400" y="2374326"/>
+          <a:ext cx="3581401" cy="4407476"/>
         </p:xfrm>
         <a:graphic>
           <a:graphicData uri="http://schemas.openxmlformats.org/drawingml/2006/table">
@@ -8716,11 +8732,11 @@
                 <a:tableStyleId>{7DF18680-E054-41AD-8BC1-D1AEF772440D}</a:tableStyleId>
               </a:tblPr>
               <a:tblGrid>
-                <a:gridCol w="685800"/>
-                <a:gridCol w="437777"/>
+                <a:gridCol w="762000"/>
+                <a:gridCol w="361577"/>
                 <a:gridCol w="2457824"/>
               </a:tblGrid>
-              <a:tr h="201351">
+              <a:tr h="208563">
                 <a:tc>
                   <a:txBody>
                     <a:bodyPr/>
@@ -8764,7 +8780,7 @@
                   <a:tcPr marL="27432" marR="18288" marT="18288" marB="0"/>
                 </a:tc>
               </a:tr>
-              <a:tr h="157269">
+              <a:tr h="162902">
                 <a:tc>
                   <a:txBody>
                     <a:bodyPr/>
@@ -8824,7 +8840,7 @@
                   <a:tcPr marL="27432" marR="18288" marT="18288" marB="0"/>
                 </a:tc>
               </a:tr>
-              <a:tr h="157269">
+              <a:tr h="162902">
                 <a:tc>
                   <a:txBody>
                     <a:bodyPr/>
@@ -8872,7 +8888,31 @@
                             <a:schemeClr val="tx1"/>
                           </a:solidFill>
                         </a:rPr>
-                        <a:t>identifier for a single file</a:t>
+                        <a:t>Unique</a:t>
+                      </a:r>
+                      <a:r>
+                        <a:rPr lang="en-US" sz="800" b="0" baseline="0" dirty="0" smtClean="0">
+                          <a:solidFill>
+                            <a:schemeClr val="tx1"/>
+                          </a:solidFill>
+                        </a:rPr>
+                        <a:t> i</a:t>
+                      </a:r>
+                      <a:r>
+                        <a:rPr lang="en-US" sz="800" b="0" dirty="0" smtClean="0">
+                          <a:solidFill>
+                            <a:schemeClr val="tx1"/>
+                          </a:solidFill>
+                        </a:rPr>
+                        <a:t>dentifier </a:t>
+                      </a:r>
+                      <a:r>
+                        <a:rPr lang="en-US" sz="800" b="0" dirty="0" smtClean="0">
+                          <a:solidFill>
+                            <a:schemeClr val="tx1"/>
+                          </a:solidFill>
+                        </a:rPr>
+                        <a:t>for a single file</a:t>
                       </a:r>
                       <a:endParaRPr lang="en-US" sz="800" b="0" dirty="0">
                         <a:solidFill>
@@ -8884,7 +8924,7 @@
                   <a:tcPr marL="27432" marR="18288" marT="18288" marB="0"/>
                 </a:tc>
               </a:tr>
-              <a:tr h="157269">
+              <a:tr h="162902">
                 <a:tc>
                   <a:txBody>
                     <a:bodyPr/>
@@ -8944,7 +8984,7 @@
                   <a:tcPr marL="27432" marR="18288" marT="18288" marB="0"/>
                 </a:tc>
               </a:tr>
-              <a:tr h="157269">
+              <a:tr h="162902">
                 <a:tc>
                   <a:txBody>
                     <a:bodyPr/>
@@ -9012,7 +9052,7 @@
                   <a:tcPr marL="27432" marR="18288" marT="18288" marB="0"/>
                 </a:tc>
               </a:tr>
-              <a:tr h="157269">
+              <a:tr h="162902">
                 <a:tc>
                   <a:txBody>
                     <a:bodyPr/>
@@ -9080,7 +9120,7 @@
                   <a:tcPr marL="27432" marR="18288" marT="18288" marB="0"/>
                 </a:tc>
               </a:tr>
-              <a:tr h="157269">
+              <a:tr h="162902">
                 <a:tc>
                   <a:txBody>
                     <a:bodyPr/>
@@ -9140,7 +9180,7 @@
                   <a:tcPr marL="27432" marR="18288" marT="18288" marB="0"/>
                 </a:tc>
               </a:tr>
-              <a:tr h="157269">
+              <a:tr h="271516">
                 <a:tc>
                   <a:txBody>
                     <a:bodyPr/>
@@ -9224,7 +9264,7 @@
                   <a:tcPr marL="27432" marR="18288" marT="18288" marB="0"/>
                 </a:tc>
               </a:tr>
-              <a:tr h="157269">
+              <a:tr h="162902">
                 <a:tc>
                   <a:txBody>
                     <a:bodyPr/>
@@ -9292,7 +9332,7 @@
                   <a:tcPr marL="27432" marR="18288" marT="18288" marB="0"/>
                 </a:tc>
               </a:tr>
-              <a:tr h="157269">
+              <a:tr h="162902">
                 <a:tc>
                   <a:txBody>
                     <a:bodyPr/>
@@ -9352,19 +9392,20 @@
                         <a:defRPr/>
                       </a:pPr>
                       <a:r>
-                        <a:rPr lang="en-US" sz="800" dirty="0" err="1" smtClean="0"/>
-                        <a:t>Libmagic</a:t>
-                      </a:r>
-                      <a:r>
                         <a:rPr lang="en-US" sz="800" dirty="0" smtClean="0"/>
-                        <a:t> sniffed file type</a:t>
-                      </a:r>
-                    </a:p>
-                  </a:txBody>
-                  <a:tcPr marL="27432" marR="18288" marT="18288" marB="0"/>
-                </a:tc>
-              </a:tr>
-              <a:tr h="157269">
+                        <a:t>The</a:t>
+                      </a:r>
+                      <a:r>
+                        <a:rPr lang="en-US" sz="800" baseline="0" dirty="0" smtClean="0"/>
+                        <a:t> file type, as determined by Bro’s signatures</a:t>
+                      </a:r>
+                      <a:endParaRPr lang="en-US" sz="800" dirty="0" smtClean="0"/>
+                    </a:p>
+                  </a:txBody>
+                  <a:tcPr marL="27432" marR="18288" marT="18288" marB="0"/>
+                </a:tc>
+              </a:tr>
+              <a:tr h="271516">
                 <a:tc>
                   <a:txBody>
                     <a:bodyPr/>
@@ -9424,7 +9465,7 @@
                   <a:tcPr marL="27432" marR="18288" marT="18288" marB="0"/>
                 </a:tc>
               </a:tr>
-              <a:tr h="157269">
+              <a:tr h="162902">
                 <a:tc>
                   <a:txBody>
                     <a:bodyPr/>
@@ -9508,7 +9549,7 @@
                   <a:tcPr marL="27432" marR="18288" marT="18288" marB="0"/>
                 </a:tc>
               </a:tr>
-              <a:tr h="157269">
+              <a:tr h="162902">
                 <a:tc>
                   <a:txBody>
                     <a:bodyPr/>
@@ -9592,7 +9633,7 @@
                   <a:tcPr marL="27432" marR="18288" marT="18288" marB="0"/>
                 </a:tc>
               </a:tr>
-              <a:tr h="157269">
+              <a:tr h="162902">
                 <a:tc>
                   <a:txBody>
                     <a:bodyPr/>
@@ -9660,7 +9701,7 @@
                   <a:tcPr marL="27432" marR="18288" marT="18288" marB="0"/>
                 </a:tc>
               </a:tr>
-              <a:tr h="157269">
+              <a:tr h="162902">
                 <a:tc>
                   <a:txBody>
                     <a:bodyPr/>
@@ -9720,7 +9761,7 @@
                   <a:tcPr marL="27432" marR="18288" marT="18288" marB="0"/>
                 </a:tc>
               </a:tr>
-              <a:tr h="157269">
+              <a:tr h="162902">
                 <a:tc>
                   <a:txBody>
                     <a:bodyPr/>
@@ -9804,7 +9845,7 @@
                   <a:tcPr marL="27432" marR="18288" marT="18288" marB="0"/>
                 </a:tc>
               </a:tr>
-              <a:tr h="157269">
+              <a:tr h="271516">
                 <a:tc>
                   <a:txBody>
                     <a:bodyPr/>
@@ -9888,7 +9929,7 @@
                   <a:tcPr marL="27432" marR="18288" marT="18288" marB="0"/>
                 </a:tc>
               </a:tr>
-              <a:tr h="157269">
+              <a:tr h="397803">
                 <a:tc>
                   <a:txBody>
                     <a:bodyPr/>
@@ -9948,7 +9989,7 @@
                   <a:tcPr marL="27432" marR="18288" marT="18288" marB="0"/>
                 </a:tc>
               </a:tr>
-              <a:tr h="157269">
+              <a:tr h="162902">
                 <a:tc>
                   <a:txBody>
                     <a:bodyPr/>
@@ -10008,7 +10049,7 @@
                   <a:tcPr marL="27432" marR="18288" marT="18288" marB="0"/>
                 </a:tc>
               </a:tr>
-              <a:tr h="157269">
+              <a:tr h="271516">
                 <a:tc>
                   <a:txBody>
                     <a:bodyPr/>
@@ -10076,7 +10117,7 @@
                   <a:tcPr marL="27432" marR="18288" marT="18288" marB="0"/>
                 </a:tc>
               </a:tr>
-              <a:tr h="157269">
+              <a:tr h="271516">
                 <a:tc>
                   <a:txBody>
                     <a:bodyPr/>
@@ -10136,7 +10177,7 @@
                   <a:tcPr marL="27432" marR="18288" marT="18288" marB="0"/>
                 </a:tc>
               </a:tr>
-              <a:tr h="157269">
+              <a:tr h="162902">
                 <a:tc>
                   <a:txBody>
                     <a:bodyPr/>
@@ -10216,7 +10257,7 @@
         </p:nvSpPr>
         <p:spPr>
           <a:xfrm>
-            <a:off x="77266" y="2057400"/>
+            <a:off x="77266" y="1944866"/>
             <a:ext cx="1592240" cy="461665"/>
           </a:xfrm>
           <a:prstGeom prst="rect">
@@ -10277,14 +10318,14 @@
           <p:nvPr>
             <p:extLst>
               <p:ext uri="{D42A27DB-BD31-4B8C-83A1-F6EECF244321}">
-                <p14:modId xmlns:p14="http://schemas.microsoft.com/office/powerpoint/2010/main" val="4013783491"/>
+                <p14:modId xmlns:p14="http://schemas.microsoft.com/office/powerpoint/2010/main" val="256378354"/>
               </p:ext>
             </p:extLst>
           </p:nvPr>
         </p:nvGraphicFramePr>
         <p:xfrm>
           <a:off x="152400" y="903161"/>
-          <a:ext cx="2971800" cy="973506"/>
+          <a:ext cx="2971800" cy="1001839"/>
         </p:xfrm>
         <a:graphic>
           <a:graphicData uri="http://schemas.openxmlformats.org/drawingml/2006/table">
@@ -10297,7 +10338,7 @@
                 <a:gridCol w="381000"/>
                 <a:gridCol w="2057400"/>
               </a:tblGrid>
-              <a:tr h="190616">
+              <a:tr h="196164">
                 <a:tc>
                   <a:txBody>
                     <a:bodyPr/>
@@ -10341,7 +10382,7 @@
                   <a:tcPr marL="27432" marR="18288" marT="18288" marB="0"/>
                 </a:tc>
               </a:tr>
-              <a:tr h="156578">
+              <a:tr h="161135">
                 <a:tc>
                   <a:txBody>
                     <a:bodyPr/>
@@ -10385,7 +10426,7 @@
                   <a:tcPr marL="27432" marR="18288" marT="18288" marB="0"/>
                 </a:tc>
               </a:tr>
-              <a:tr h="156578">
+              <a:tr h="161135">
                 <a:tc>
                   <a:txBody>
                     <a:bodyPr/>
@@ -10454,7 +10495,7 @@
                   <a:tcPr marL="27432" marR="18288" marT="18288" marB="0"/>
                 </a:tc>
               </a:tr>
-              <a:tr h="156578">
+              <a:tr h="161135">
                 <a:tc>
                   <a:txBody>
                     <a:bodyPr/>
@@ -10502,7 +10543,7 @@
                   <a:tcPr marL="27432" marR="18288" marT="18288" marB="0"/>
                 </a:tc>
               </a:tr>
-              <a:tr h="156578">
+              <a:tr h="161135">
                 <a:tc>
                   <a:txBody>
                     <a:bodyPr/>
@@ -10546,7 +10587,7 @@
                   <a:tcPr marL="27432" marR="18288" marT="18288" marB="0"/>
                 </a:tc>
               </a:tr>
-              <a:tr h="156578">
+              <a:tr h="161135">
                 <a:tc>
                   <a:txBody>
                     <a:bodyPr/>
@@ -10652,14 +10693,14 @@
           <p:nvPr>
             <p:extLst>
               <p:ext uri="{D42A27DB-BD31-4B8C-83A1-F6EECF244321}">
-                <p14:modId xmlns:p14="http://schemas.microsoft.com/office/powerpoint/2010/main" val="2279302017"/>
+                <p14:modId xmlns:p14="http://schemas.microsoft.com/office/powerpoint/2010/main" val="2669589274"/>
               </p:ext>
             </p:extLst>
           </p:nvPr>
         </p:nvGraphicFramePr>
         <p:xfrm>
-          <a:off x="3886201" y="7230440"/>
-          <a:ext cx="3276599" cy="1991061"/>
+          <a:off x="3886201" y="7305339"/>
+          <a:ext cx="3276599" cy="2067261"/>
         </p:xfrm>
         <a:graphic>
           <a:graphicData uri="http://schemas.openxmlformats.org/drawingml/2006/table">
@@ -11315,7 +11356,7 @@
                   <a:tcPr marL="27432" marR="9144" marT="18288" marB="0"/>
                 </a:tc>
               </a:tr>
-              <a:tr h="162090">
+              <a:tr h="238290">
                 <a:tc>
                   <a:txBody>
                     <a:bodyPr/>
@@ -11391,7 +11432,7 @@
         </p:nvSpPr>
         <p:spPr>
           <a:xfrm>
-            <a:off x="3810000" y="6803184"/>
+            <a:off x="3810000" y="6878083"/>
             <a:ext cx="2075458" cy="461665"/>
           </a:xfrm>
           <a:prstGeom prst="rect">
@@ -11461,14 +11502,14 @@
           <p:nvPr>
             <p:extLst>
               <p:ext uri="{D42A27DB-BD31-4B8C-83A1-F6EECF244321}">
-                <p14:modId xmlns:p14="http://schemas.microsoft.com/office/powerpoint/2010/main" val="4002369252"/>
+                <p14:modId xmlns:p14="http://schemas.microsoft.com/office/powerpoint/2010/main" val="3920599943"/>
               </p:ext>
             </p:extLst>
           </p:nvPr>
         </p:nvGraphicFramePr>
         <p:xfrm>
-          <a:off x="162035" y="7240532"/>
-          <a:ext cx="3571765" cy="1999697"/>
+          <a:off x="162035" y="7238996"/>
+          <a:ext cx="3571765" cy="2068843"/>
         </p:xfrm>
         <a:graphic>
           <a:graphicData uri="http://schemas.openxmlformats.org/drawingml/2006/table">
@@ -11481,7 +11522,7 @@
                 <a:gridCol w="396360"/>
                 <a:gridCol w="2436985"/>
               </a:tblGrid>
-              <a:tr h="191981">
+              <a:tr h="198619">
                 <a:tc>
                   <a:txBody>
                     <a:bodyPr/>
@@ -11525,7 +11566,7 @@
                   <a:tcPr marL="27432" marR="18288" marT="18288" marB="0"/>
                 </a:tc>
               </a:tr>
-              <a:tr h="150643">
+              <a:tr h="155852">
                 <a:tc>
                   <a:txBody>
                     <a:bodyPr/>
@@ -11593,7 +11634,7 @@
                   <a:tcPr marL="27432" marR="18288" marT="18288" marB="0"/>
                 </a:tc>
               </a:tr>
-              <a:tr h="150643">
+              <a:tr h="155852">
                 <a:tc>
                   <a:txBody>
                     <a:bodyPr/>
@@ -11662,7 +11703,7 @@
                   <a:tcPr marL="27432" marR="18288" marT="18288" marB="0"/>
                 </a:tc>
               </a:tr>
-              <a:tr h="150643">
+              <a:tr h="155852">
                 <a:tc>
                   <a:txBody>
                     <a:bodyPr/>
@@ -11722,7 +11763,7 @@
                   <a:tcPr marL="27432" marR="18288" marT="18288" marB="0"/>
                 </a:tc>
               </a:tr>
-              <a:tr h="150643">
+              <a:tr h="155852">
                 <a:tc>
                   <a:txBody>
                     <a:bodyPr/>
@@ -11782,7 +11823,7 @@
                   <a:tcPr marL="27432" marR="18288" marT="18288" marB="0"/>
                 </a:tc>
               </a:tr>
-              <a:tr h="150643">
+              <a:tr h="155852">
                 <a:tc>
                   <a:txBody>
                     <a:bodyPr/>
@@ -11843,7 +11884,7 @@
                   <a:tcPr marL="27432" marR="18288" marT="18288" marB="0"/>
                 </a:tc>
               </a:tr>
-              <a:tr h="150643">
+              <a:tr h="155852">
                 <a:tc>
                   <a:txBody>
                     <a:bodyPr/>
@@ -11908,7 +11949,7 @@
                   <a:tcPr marL="27432" marR="18288" marT="18288" marB="0"/>
                 </a:tc>
               </a:tr>
-              <a:tr h="150643">
+              <a:tr h="155852">
                 <a:tc>
                   <a:txBody>
                     <a:bodyPr/>
@@ -11977,7 +12018,7 @@
                   <a:tcPr marL="27432" marR="18288" marT="18288" marB="0"/>
                 </a:tc>
               </a:tr>
-              <a:tr h="150643">
+              <a:tr h="155852">
                 <a:tc>
                   <a:txBody>
                     <a:bodyPr/>
@@ -12037,7 +12078,7 @@
                   <a:tcPr marL="27432" marR="18288" marT="18288" marB="0"/>
                 </a:tc>
               </a:tr>
-              <a:tr h="150643">
+              <a:tr h="155852">
                 <a:tc>
                   <a:txBody>
                     <a:bodyPr/>
@@ -12097,7 +12138,7 @@
                   <a:tcPr marL="27432" marR="18288" marT="18288" marB="0"/>
                 </a:tc>
               </a:tr>
-              <a:tr h="150643">
+              <a:tr h="155852">
                 <a:tc>
                   <a:txBody>
                     <a:bodyPr/>
@@ -12157,7 +12198,7 @@
                   <a:tcPr marL="27432" marR="18288" marT="18288" marB="0"/>
                 </a:tc>
               </a:tr>
-              <a:tr h="150643">
+              <a:tr h="155852">
                 <a:tc>
                   <a:txBody>
                     <a:bodyPr/>
@@ -12238,7 +12279,7 @@
                   <a:tcPr marL="27432" marR="18288" marT="18288" marB="0"/>
                 </a:tc>
               </a:tr>
-              <a:tr h="150643">
+              <a:tr h="155852">
                 <a:tc>
                   <a:txBody>
                     <a:bodyPr/>
@@ -12310,7 +12351,7 @@
         </p:nvSpPr>
         <p:spPr>
           <a:xfrm>
-            <a:off x="76200" y="6790390"/>
+            <a:off x="76200" y="6781800"/>
             <a:ext cx="1943523" cy="461665"/>
           </a:xfrm>
           <a:prstGeom prst="rect">
@@ -12380,14 +12421,14 @@
           <p:nvPr>
             <p:extLst>
               <p:ext uri="{D42A27DB-BD31-4B8C-83A1-F6EECF244321}">
-                <p14:modId xmlns:p14="http://schemas.microsoft.com/office/powerpoint/2010/main" val="4027594867"/>
+                <p14:modId xmlns:p14="http://schemas.microsoft.com/office/powerpoint/2010/main" val="1633613185"/>
               </p:ext>
             </p:extLst>
           </p:nvPr>
         </p:nvGraphicFramePr>
         <p:xfrm>
-          <a:off x="3922747" y="5202985"/>
-          <a:ext cx="3295012" cy="1465815"/>
+          <a:off x="3922747" y="5279181"/>
+          <a:ext cx="3295012" cy="1578819"/>
         </p:xfrm>
         <a:graphic>
           <a:graphicData uri="http://schemas.openxmlformats.org/drawingml/2006/table">
@@ -12400,7 +12441,7 @@
                 <a:gridCol w="346696"/>
                 <a:gridCol w="2060923"/>
               </a:tblGrid>
-              <a:tr h="161171">
+              <a:tr h="183846">
                 <a:tc>
                   <a:txBody>
                     <a:bodyPr/>
@@ -12444,7 +12485,7 @@
                   <a:tcPr marL="27432" marR="18288" marT="18288" marB="0"/>
                 </a:tc>
               </a:tr>
-              <a:tr h="143903">
+              <a:tr h="154997">
                 <a:tc>
                   <a:txBody>
                     <a:bodyPr/>
@@ -12494,7 +12535,7 @@
                   <a:tcPr marL="27432" marR="18288" marT="18288" marB="0"/>
                 </a:tc>
               </a:tr>
-              <a:tr h="143903">
+              <a:tr h="154997">
                 <a:tc>
                   <a:txBody>
                     <a:bodyPr/>
@@ -12563,7 +12604,7 @@
                   <a:tcPr marL="27432" marR="18288" marT="18288" marB="0"/>
                 </a:tc>
               </a:tr>
-              <a:tr h="143903">
+              <a:tr h="154997">
                 <a:tc>
                   <a:txBody>
                     <a:bodyPr/>
@@ -12631,7 +12672,7 @@
                   <a:tcPr marL="27432" marR="18288" marT="18288" marB="0"/>
                 </a:tc>
               </a:tr>
-              <a:tr h="143903">
+              <a:tr h="154997">
                 <a:tc>
                   <a:txBody>
                     <a:bodyPr/>
@@ -12699,7 +12740,7 @@
                   <a:tcPr marL="27432" marR="18288" marT="18288" marB="0"/>
                 </a:tc>
               </a:tr>
-              <a:tr h="143903">
+              <a:tr h="154997">
                 <a:tc>
                   <a:txBody>
                     <a:bodyPr/>
@@ -12772,7 +12813,7 @@
                   <a:tcPr marL="27432" marR="18288" marT="18288" marB="0"/>
                 </a:tc>
               </a:tr>
-              <a:tr h="143903">
+              <a:tr h="154997">
                 <a:tc>
                   <a:txBody>
                     <a:bodyPr/>
@@ -12840,7 +12881,7 @@
                   <a:tcPr marL="27432" marR="18288" marT="18288" marB="0"/>
                 </a:tc>
               </a:tr>
-              <a:tr h="143903">
+              <a:tr h="154997">
                 <a:tc>
                   <a:txBody>
                     <a:bodyPr/>
@@ -12908,7 +12949,7 @@
                   <a:tcPr marL="27432" marR="18288" marT="18288" marB="0"/>
                 </a:tc>
               </a:tr>
-              <a:tr h="143903">
+              <a:tr h="154997">
                 <a:tc>
                   <a:txBody>
                     <a:bodyPr/>
@@ -12976,7 +13017,7 @@
                   <a:tcPr marL="27432" marR="18288" marT="18288" marB="0"/>
                 </a:tc>
               </a:tr>
-              <a:tr h="143903">
+              <a:tr h="154997">
                 <a:tc>
                   <a:txBody>
                     <a:bodyPr/>
@@ -13056,7 +13097,7 @@
         </p:nvSpPr>
         <p:spPr>
           <a:xfrm>
-            <a:off x="3828005" y="4735935"/>
+            <a:off x="3828005" y="4812131"/>
             <a:ext cx="3345461" cy="461665"/>
           </a:xfrm>
           <a:prstGeom prst="rect">
@@ -13162,14 +13203,14 @@
           <p:nvPr>
             <p:extLst>
               <p:ext uri="{D42A27DB-BD31-4B8C-83A1-F6EECF244321}">
-                <p14:modId xmlns:p14="http://schemas.microsoft.com/office/powerpoint/2010/main" val="2591037081"/>
+                <p14:modId xmlns:p14="http://schemas.microsoft.com/office/powerpoint/2010/main" val="3257187579"/>
               </p:ext>
             </p:extLst>
           </p:nvPr>
         </p:nvGraphicFramePr>
         <p:xfrm>
-          <a:off x="3914108" y="762000"/>
-          <a:ext cx="3266965" cy="3831206"/>
+          <a:off x="3914108" y="893194"/>
+          <a:ext cx="3266965" cy="3907398"/>
         </p:xfrm>
         <a:graphic>
           <a:graphicData uri="http://schemas.openxmlformats.org/drawingml/2006/table">
@@ -13182,7 +13223,7 @@
                 <a:gridCol w="381000"/>
                 <a:gridCol w="2057399"/>
               </a:tblGrid>
-              <a:tr h="187478">
+              <a:tr h="191207">
                 <a:tc>
                   <a:txBody>
                     <a:bodyPr/>
@@ -13226,7 +13267,7 @@
                   <a:tcPr marL="27432" marR="18288" marT="18288" marB="0"/>
                 </a:tc>
               </a:tr>
-              <a:tr h="146434">
+              <a:tr h="149346">
                 <a:tc>
                   <a:txBody>
                     <a:bodyPr/>
@@ -13290,7 +13331,7 @@
                   <a:tcPr marL="27432" marR="18288" marT="18288" marB="0"/>
                 </a:tc>
               </a:tr>
-              <a:tr h="146434">
+              <a:tr h="149346">
                 <a:tc>
                   <a:txBody>
                     <a:bodyPr/>
@@ -13359,7 +13400,7 @@
                   <a:tcPr marL="27432" marR="18288" marT="18288" marB="0"/>
                 </a:tc>
               </a:tr>
-              <a:tr h="167587">
+              <a:tr h="170920">
                 <a:tc>
                   <a:txBody>
                     <a:bodyPr/>
@@ -13427,7 +13468,7 @@
                   <a:tcPr marL="27432" marR="18288" marT="18288" marB="0"/>
                 </a:tc>
               </a:tr>
-              <a:tr h="146434">
+              <a:tr h="149346">
                 <a:tc>
                   <a:txBody>
                     <a:bodyPr/>
@@ -13495,7 +13536,7 @@
                   <a:tcPr marL="27432" marR="18288" marT="18288" marB="0"/>
                 </a:tc>
               </a:tr>
-              <a:tr h="146434">
+              <a:tr h="149346">
                 <a:tc>
                   <a:txBody>
                     <a:bodyPr/>
@@ -13563,7 +13604,7 @@
                   <a:tcPr marL="27432" marR="18288" marT="18288" marB="0"/>
                 </a:tc>
               </a:tr>
-              <a:tr h="146434">
+              <a:tr h="149346">
                 <a:tc>
                   <a:txBody>
                     <a:bodyPr/>
@@ -13615,7 +13656,7 @@
                   <a:tcPr marL="27432" marR="18288" marT="18288" marB="0"/>
                 </a:tc>
               </a:tr>
-              <a:tr h="146434">
+              <a:tr h="149346">
                 <a:tc>
                   <a:txBody>
                     <a:bodyPr/>
@@ -13675,7 +13716,7 @@
                   <a:tcPr marL="27432" marR="18288" marT="18288" marB="0"/>
                 </a:tc>
               </a:tr>
-              <a:tr h="146434">
+              <a:tr h="149346">
                 <a:tc>
                   <a:txBody>
                     <a:bodyPr/>
@@ -13727,7 +13768,7 @@
                   <a:tcPr marL="27432" marR="18288" marT="18288" marB="0"/>
                 </a:tc>
               </a:tr>
-              <a:tr h="254361">
+              <a:tr h="267342">
                 <a:tc>
                   <a:txBody>
                     <a:bodyPr/>
@@ -13793,7 +13834,7 @@
                   <a:tcPr marL="27432" marR="18288" marT="18288" marB="0"/>
                 </a:tc>
               </a:tr>
-              <a:tr h="254361">
+              <a:tr h="267342">
                 <a:tc>
                   <a:txBody>
                     <a:bodyPr/>
@@ -13855,7 +13896,7 @@
                   <a:tcPr marL="27432" marR="18288" marT="18288" marB="0"/>
                 </a:tc>
               </a:tr>
-              <a:tr h="146434">
+              <a:tr h="149346">
                 <a:tc>
                   <a:txBody>
                     <a:bodyPr/>
@@ -13911,7 +13952,7 @@
                   <a:tcPr marL="27432" marR="18288" marT="18288" marB="0"/>
                 </a:tc>
               </a:tr>
-              <a:tr h="146434">
+              <a:tr h="149346">
                 <a:tc>
                   <a:txBody>
                     <a:bodyPr/>
@@ -13963,7 +14004,7 @@
                   <a:tcPr marL="27432" marR="18288" marT="18288" marB="0"/>
                 </a:tc>
               </a:tr>
-              <a:tr h="146434">
+              <a:tr h="149346">
                 <a:tc>
                   <a:txBody>
                     <a:bodyPr/>
@@ -14015,7 +14056,7 @@
                   <a:tcPr marL="27432" marR="18288" marT="18288" marB="0"/>
                 </a:tc>
               </a:tr>
-              <a:tr h="146434">
+              <a:tr h="149346">
                 <a:tc>
                   <a:txBody>
                     <a:bodyPr/>
@@ -14067,7 +14108,7 @@
                   <a:tcPr marL="27432" marR="18288" marT="18288" marB="0"/>
                 </a:tc>
               </a:tr>
-              <a:tr h="146434">
+              <a:tr h="149346">
                 <a:tc>
                   <a:txBody>
                     <a:bodyPr/>
@@ -14123,7 +14164,7 @@
                   <a:tcPr marL="27432" marR="18288" marT="18288" marB="0"/>
                 </a:tc>
               </a:tr>
-              <a:tr h="169639">
+              <a:tr h="173013">
                 <a:tc>
                   <a:txBody>
                     <a:bodyPr/>
@@ -14175,7 +14216,7 @@
                   <a:tcPr marL="27432" marR="18288" marT="18288" marB="0"/>
                 </a:tc>
               </a:tr>
-              <a:tr h="146434">
+              <a:tr h="149346">
                 <a:tc>
                   <a:txBody>
                     <a:bodyPr/>
@@ -14239,7 +14280,7 @@
                   <a:tcPr marL="27432" marR="18288" marT="18288" marB="0"/>
                 </a:tc>
               </a:tr>
-              <a:tr h="146434">
+              <a:tr h="149346">
                 <a:tc>
                   <a:txBody>
                     <a:bodyPr/>
@@ -14299,7 +14340,7 @@
                   <a:tcPr marL="27432" marR="18288" marT="18288" marB="0"/>
                 </a:tc>
               </a:tr>
-              <a:tr h="146434">
+              <a:tr h="149346">
                 <a:tc>
                   <a:txBody>
                     <a:bodyPr/>
@@ -14363,7 +14404,7 @@
                   <a:tcPr marL="27432" marR="18288" marT="18288" marB="0"/>
                 </a:tc>
               </a:tr>
-              <a:tr h="146434">
+              <a:tr h="149346">
                 <a:tc>
                   <a:txBody>
                     <a:bodyPr/>
@@ -14419,7 +14460,7 @@
                   <a:tcPr marL="27432" marR="18288" marT="18288" marB="0"/>
                 </a:tc>
               </a:tr>
-              <a:tr h="146434">
+              <a:tr h="149346">
                 <a:tc>
                   <a:txBody>
                     <a:bodyPr/>
@@ -14479,7 +14520,7 @@
                   <a:tcPr marL="27432" marR="18288" marT="18288" marB="0"/>
                 </a:tc>
               </a:tr>
-              <a:tr h="146434">
+              <a:tr h="149346">
                 <a:tc>
                   <a:txBody>
                     <a:bodyPr/>
@@ -14535,7 +14576,7 @@
                   <a:tcPr marL="27432" marR="18288" marT="18288" marB="0"/>
                 </a:tc>
               </a:tr>
-              <a:tr h="146434">
+              <a:tr h="149346">
                 <a:tc>
                   <a:txBody>
                     <a:bodyPr/>
@@ -14603,7 +14644,7 @@
         </p:nvSpPr>
         <p:spPr>
           <a:xfrm>
-            <a:off x="3828274" y="310363"/>
+            <a:off x="3828274" y="441557"/>
             <a:ext cx="2057424" cy="461665"/>
           </a:xfrm>
           <a:prstGeom prst="rect">
@@ -14689,9 +14730,7 @@
             <a:r>
               <a:rPr lang="en-US" sz="2400" dirty="0" smtClean="0">
                 <a:solidFill>
-                  <a:schemeClr val="bg1">
-                    <a:lumMod val="75000"/>
-                  </a:schemeClr>
+                  <a:srgbClr val="006699"/>
                 </a:solidFill>
                 <a:latin typeface="Arial Black" pitchFamily="34" charset="0"/>
               </a:rPr>
@@ -14699,9 +14738,7 @@
             </a:r>
             <a:endParaRPr lang="en-US" sz="2400" dirty="0">
               <a:solidFill>
-                <a:schemeClr val="bg1">
-                  <a:lumMod val="75000"/>
-                </a:schemeClr>
+                <a:srgbClr val="006699"/>
               </a:solidFill>
               <a:latin typeface="Arial Black" pitchFamily="34" charset="0"/>
             </a:endParaRPr>
@@ -14762,11 +14799,7 @@
           <a:p>
             <a:r>
               <a:rPr lang="en-US" sz="800" dirty="0" smtClean="0"/>
-              <a:t>Version: </a:t>
-            </a:r>
-            <a:r>
-              <a:rPr lang="en-US" sz="800" dirty="0" smtClean="0"/>
-              <a:t>2.0</a:t>
+              <a:t>Version: 2.0</a:t>
             </a:r>
             <a:endParaRPr lang="en-US" sz="800" dirty="0"/>
           </a:p>
@@ -14873,11 +14906,7 @@
             </a:r>
             <a:r>
               <a:rPr lang="en-US" sz="800" dirty="0" smtClean="0"/>
-              <a:t> LLC</a:t>
-            </a:r>
-            <a:r>
-              <a:rPr lang="en-US" sz="800" dirty="0" smtClean="0"/>
-              <a:t>. </a:t>
+              <a:t> LLC. </a:t>
             </a:r>
             <a:endParaRPr lang="en-US" sz="800" dirty="0"/>
           </a:p>
@@ -14922,14 +14951,14 @@
           <p:nvPr>
             <p:extLst>
               <p:ext uri="{D42A27DB-BD31-4B8C-83A1-F6EECF244321}">
-                <p14:modId xmlns:p14="http://schemas.microsoft.com/office/powerpoint/2010/main" val="2996251033"/>
+                <p14:modId xmlns:p14="http://schemas.microsoft.com/office/powerpoint/2010/main" val="3882689392"/>
               </p:ext>
             </p:extLst>
           </p:nvPr>
         </p:nvGraphicFramePr>
         <p:xfrm>
-          <a:off x="146368" y="890154"/>
-          <a:ext cx="3033576" cy="2874924"/>
+          <a:off x="146368" y="890155"/>
+          <a:ext cx="3033576" cy="2855624"/>
         </p:xfrm>
         <a:graphic>
           <a:graphicData uri="http://schemas.openxmlformats.org/drawingml/2006/table">
@@ -14942,7 +14971,7 @@
                 <a:gridCol w="418261"/>
                 <a:gridCol w="1884544"/>
               </a:tblGrid>
-              <a:tr h="201351">
+              <a:tr h="192152">
                 <a:tc>
                   <a:txBody>
                     <a:bodyPr/>
@@ -14986,7 +15015,7 @@
                   <a:tcPr marL="27432" marR="18288" marT="18288" marB="0"/>
                 </a:tc>
               </a:tr>
-              <a:tr h="157269">
+              <a:tr h="150084">
                 <a:tc>
                   <a:txBody>
                     <a:bodyPr/>
@@ -15050,7 +15079,7 @@
                   <a:tcPr marL="27432" marR="18288" marT="18288" marB="0"/>
                 </a:tc>
               </a:tr>
-              <a:tr h="157269">
+              <a:tr h="150084">
                 <a:tc>
                   <a:txBody>
                     <a:bodyPr/>
@@ -15119,7 +15148,7 @@
                   <a:tcPr marL="27432" marR="18288" marT="18288" marB="0"/>
                 </a:tc>
               </a:tr>
-              <a:tr h="157269">
+              <a:tr h="150084">
                 <a:tc>
                   <a:txBody>
                     <a:bodyPr/>
@@ -15187,7 +15216,7 @@
                   <a:tcPr marL="27432" marR="18288" marT="18288" marB="0"/>
                 </a:tc>
               </a:tr>
-              <a:tr h="157269">
+              <a:tr h="250152">
                 <a:tc>
                   <a:txBody>
                     <a:bodyPr/>
@@ -15247,19 +15276,20 @@
                         <a:defRPr/>
                       </a:pPr>
                       <a:r>
-                        <a:rPr lang="en-US" sz="800" dirty="0" err="1" smtClean="0"/>
-                        <a:t>Libmagic</a:t>
-                      </a:r>
-                      <a:r>
                         <a:rPr lang="en-US" sz="800" dirty="0" smtClean="0"/>
-                        <a:t> sniffed file type</a:t>
-                      </a:r>
-                    </a:p>
-                  </a:txBody>
-                  <a:tcPr marL="27432" marR="18288" marT="18288" marB="0"/>
-                </a:tc>
-              </a:tr>
-              <a:tr h="157269">
+                        <a:t>The</a:t>
+                      </a:r>
+                      <a:r>
+                        <a:rPr lang="en-US" sz="800" baseline="0" dirty="0" smtClean="0"/>
+                        <a:t> file type, as determined by Bro’s signatures</a:t>
+                      </a:r>
+                      <a:endParaRPr lang="en-US" sz="800" dirty="0" smtClean="0"/>
+                    </a:p>
+                  </a:txBody>
+                  <a:tcPr marL="27432" marR="18288" marT="18288" marB="0"/>
+                </a:tc>
+              </a:tr>
+              <a:tr h="150084">
                 <a:tc>
                   <a:txBody>
                     <a:bodyPr/>
@@ -15327,7 +15357,7 @@
                   <a:tcPr marL="27432" marR="18288" marT="18288" marB="0"/>
                 </a:tc>
               </a:tr>
-              <a:tr h="157269">
+              <a:tr h="150084">
                 <a:tc>
                   <a:txBody>
                     <a:bodyPr/>
@@ -15395,7 +15425,7 @@
                   <a:tcPr marL="27432" marR="18288" marT="18288" marB="0"/>
                 </a:tc>
               </a:tr>
-              <a:tr h="157269">
+              <a:tr h="150084">
                 <a:tc>
                   <a:txBody>
                     <a:bodyPr/>
@@ -15447,7 +15477,7 @@
                   <a:tcPr marL="27432" marR="18288" marT="18288" marB="0"/>
                 </a:tc>
               </a:tr>
-              <a:tr h="157269">
+              <a:tr h="150084">
                 <a:tc>
                   <a:txBody>
                     <a:bodyPr/>
@@ -15499,7 +15529,7 @@
                   <a:tcPr marL="27432" marR="18288" marT="18288" marB="0"/>
                 </a:tc>
               </a:tr>
-              <a:tr h="157269">
+              <a:tr h="150084">
                 <a:tc>
                   <a:txBody>
                     <a:bodyPr/>
@@ -15555,7 +15585,7 @@
                   <a:tcPr marL="27432" marR="18288" marT="18288" marB="0"/>
                 </a:tc>
               </a:tr>
-              <a:tr h="157269">
+              <a:tr h="150084">
                 <a:tc>
                   <a:txBody>
                     <a:bodyPr/>
@@ -15607,7 +15637,7 @@
                   <a:tcPr marL="27432" marR="18288" marT="18288" marB="0"/>
                 </a:tc>
               </a:tr>
-              <a:tr h="157269">
+              <a:tr h="150084">
                 <a:tc>
                   <a:txBody>
                     <a:bodyPr/>
@@ -15659,7 +15689,7 @@
                   <a:tcPr marL="27432" marR="18288" marT="18288" marB="0"/>
                 </a:tc>
               </a:tr>
-              <a:tr h="157269">
+              <a:tr h="150084">
                 <a:tc>
                   <a:txBody>
                     <a:bodyPr/>
@@ -15715,7 +15745,7 @@
                   <a:tcPr marL="27432" marR="18288" marT="18288" marB="0"/>
                 </a:tc>
               </a:tr>
-              <a:tr h="157269">
+              <a:tr h="150084">
                 <a:tc>
                   <a:txBody>
                     <a:bodyPr/>
@@ -15767,7 +15797,7 @@
                   <a:tcPr marL="27432" marR="18288" marT="18288" marB="0"/>
                 </a:tc>
               </a:tr>
-              <a:tr h="157269">
+              <a:tr h="150084">
                 <a:tc>
                   <a:txBody>
                     <a:bodyPr/>
@@ -15819,7 +15849,7 @@
                   <a:tcPr marL="27432" marR="18288" marT="18288" marB="0"/>
                 </a:tc>
               </a:tr>
-              <a:tr h="157269">
+              <a:tr h="150084">
                 <a:tc>
                   <a:txBody>
                     <a:bodyPr/>
@@ -15871,7 +15901,7 @@
                   <a:tcPr marL="27432" marR="18288" marT="18288" marB="0"/>
                 </a:tc>
               </a:tr>
-              <a:tr h="157269">
+              <a:tr h="150084">
                 <a:tc>
                   <a:txBody>
                     <a:bodyPr/>
@@ -15923,7 +15953,7 @@
                   <a:tcPr marL="27432" marR="18288" marT="18288" marB="0"/>
                 </a:tc>
               </a:tr>
-              <a:tr h="157269">
+              <a:tr h="150084">
                 <a:tc>
                   <a:txBody>
                     <a:bodyPr/>
@@ -16081,9 +16111,7 @@
             <a:r>
               <a:rPr lang="en-US" sz="2400" dirty="0" smtClean="0">
                 <a:solidFill>
-                  <a:schemeClr val="bg1">
-                    <a:lumMod val="75000"/>
-                  </a:schemeClr>
+                  <a:srgbClr val="006699"/>
                 </a:solidFill>
                 <a:latin typeface="Arial Black" pitchFamily="34" charset="0"/>
               </a:rPr>
@@ -16091,9 +16119,7 @@
             </a:r>
             <a:endParaRPr lang="en-US" sz="2400" dirty="0">
               <a:solidFill>
-                <a:schemeClr val="bg1">
-                  <a:lumMod val="75000"/>
-                </a:schemeClr>
+                <a:srgbClr val="006699"/>
               </a:solidFill>
               <a:latin typeface="Arial Black" pitchFamily="34" charset="0"/>
             </a:endParaRPr>
@@ -16139,14 +16165,14 @@
           <p:nvPr>
             <p:extLst>
               <p:ext uri="{D42A27DB-BD31-4B8C-83A1-F6EECF244321}">
-                <p14:modId xmlns:p14="http://schemas.microsoft.com/office/powerpoint/2010/main" val="2798725222"/>
+                <p14:modId xmlns:p14="http://schemas.microsoft.com/office/powerpoint/2010/main" val="1807370079"/>
               </p:ext>
             </p:extLst>
           </p:nvPr>
         </p:nvGraphicFramePr>
         <p:xfrm>
-          <a:off x="162034" y="5904774"/>
-          <a:ext cx="3038366" cy="3519246"/>
+          <a:off x="76200" y="5943600"/>
+          <a:ext cx="3038366" cy="3391635"/>
         </p:xfrm>
         <a:graphic>
           <a:graphicData uri="http://schemas.openxmlformats.org/drawingml/2006/table">
@@ -16159,7 +16185,7 @@
                 <a:gridCol w="381000"/>
                 <a:gridCol w="1905000"/>
               </a:tblGrid>
-              <a:tr h="201351">
+              <a:tr h="194049">
                 <a:tc>
                   <a:txBody>
                     <a:bodyPr/>
@@ -16203,7 +16229,7 @@
                   <a:tcPr marL="27432" marR="18288" marT="18288" marB="0"/>
                 </a:tc>
               </a:tr>
-              <a:tr h="157995">
+              <a:tr h="152266">
                 <a:tc>
                   <a:txBody>
                     <a:bodyPr/>
@@ -16263,7 +16289,7 @@
                   <a:tcPr marL="27432" marR="18288" marT="18288" marB="0"/>
                 </a:tc>
               </a:tr>
-              <a:tr h="157995">
+              <a:tr h="152266">
                 <a:tc>
                   <a:txBody>
                     <a:bodyPr/>
@@ -16332,7 +16358,7 @@
                   <a:tcPr marL="27432" marR="18288" marT="18288" marB="0"/>
                 </a:tc>
               </a:tr>
-              <a:tr h="157995">
+              <a:tr h="152266">
                 <a:tc>
                   <a:txBody>
                     <a:bodyPr/>
@@ -16385,15 +16411,7 @@
                       </a:pPr>
                       <a:r>
                         <a:rPr lang="en-US" sz="800" dirty="0" smtClean="0"/>
-                        <a:t>Transaction depth </a:t>
-                      </a:r>
-                      <a:r>
-                        <a:rPr lang="en-US" sz="800" dirty="0" smtClean="0"/>
-                        <a:t>if </a:t>
-                      </a:r>
-                      <a:r>
-                        <a:rPr lang="en-US" sz="800" dirty="0" smtClean="0"/>
-                        <a:t>there are multiple </a:t>
+                        <a:t>Transaction depth if there are multiple </a:t>
                       </a:r>
                       <a:r>
                         <a:rPr lang="en-US" sz="800" dirty="0" err="1" smtClean="0"/>
@@ -16405,7 +16423,7 @@
                   <a:tcPr marL="27432" marR="18288" marT="18288" marB="0"/>
                 </a:tc>
               </a:tr>
-              <a:tr h="157995">
+              <a:tr h="152266">
                 <a:tc>
                   <a:txBody>
                     <a:bodyPr/>
@@ -16470,7 +16488,7 @@
                   <a:tcPr marL="27432" marR="18288" marT="18288" marB="0"/>
                 </a:tc>
               </a:tr>
-              <a:tr h="157995">
+              <a:tr h="152266">
                 <a:tc>
                   <a:txBody>
                     <a:bodyPr/>
@@ -16535,7 +16553,7 @@
                   <a:tcPr marL="27432" marR="18288" marT="18288" marB="0"/>
                 </a:tc>
               </a:tr>
-              <a:tr h="157995">
+              <a:tr h="152266">
                 <a:tc>
                   <a:txBody>
                     <a:bodyPr/>
@@ -16600,7 +16618,7 @@
                   <a:tcPr marL="27432" marR="18288" marT="18288" marB="0"/>
                 </a:tc>
               </a:tr>
-              <a:tr h="157995">
+              <a:tr h="152266">
                 <a:tc>
                   <a:txBody>
                     <a:bodyPr/>
@@ -16660,7 +16678,7 @@
                   <a:tcPr marL="27432" marR="18288" marT="18288" marB="0"/>
                 </a:tc>
               </a:tr>
-              <a:tr h="157995">
+              <a:tr h="152266">
                 <a:tc>
                   <a:txBody>
                     <a:bodyPr/>
@@ -16720,7 +16738,7 @@
                   <a:tcPr marL="27432" marR="18288" marT="18288" marB="0"/>
                 </a:tc>
               </a:tr>
-              <a:tr h="157995">
+              <a:tr h="152266">
                 <a:tc>
                   <a:txBody>
                     <a:bodyPr/>
@@ -16785,7 +16803,7 @@
                   <a:tcPr marL="27432" marR="18288" marT="18288" marB="0"/>
                 </a:tc>
               </a:tr>
-              <a:tr h="157995">
+              <a:tr h="152266">
                 <a:tc>
                   <a:txBody>
                     <a:bodyPr/>
@@ -16858,7 +16876,7 @@
                   <a:tcPr marL="27432" marR="18288" marT="18288" marB="0"/>
                 </a:tc>
               </a:tr>
-              <a:tr h="157995">
+              <a:tr h="152266">
                 <a:tc>
                   <a:txBody>
                     <a:bodyPr/>
@@ -16926,7 +16944,7 @@
                   <a:tcPr marL="27432" marR="18288" marT="18288" marB="0"/>
                 </a:tc>
               </a:tr>
-              <a:tr h="157995">
+              <a:tr h="152266">
                 <a:tc>
                   <a:txBody>
                     <a:bodyPr/>
@@ -16986,7 +17004,7 @@
                   <a:tcPr marL="27432" marR="18288" marT="18288" marB="0"/>
                 </a:tc>
               </a:tr>
-              <a:tr h="157995">
+              <a:tr h="152266">
                 <a:tc>
                   <a:txBody>
                     <a:bodyPr/>
@@ -17046,7 +17064,7 @@
                   <a:tcPr marL="27432" marR="18288" marT="18288" marB="0"/>
                 </a:tc>
               </a:tr>
-              <a:tr h="157995">
+              <a:tr h="152266">
                 <a:tc>
                   <a:txBody>
                     <a:bodyPr/>
@@ -17111,7 +17129,7 @@
                   <a:tcPr marL="27432" marR="18288" marT="18288" marB="0"/>
                 </a:tc>
               </a:tr>
-              <a:tr h="157995">
+              <a:tr h="152266">
                 <a:tc>
                   <a:txBody>
                     <a:bodyPr/>
@@ -17171,7 +17189,7 @@
                   <a:tcPr marL="27432" marR="18288" marT="18288" marB="0"/>
                 </a:tc>
               </a:tr>
-              <a:tr h="157995">
+              <a:tr h="152266">
                 <a:tc>
                   <a:txBody>
                     <a:bodyPr/>
@@ -17231,7 +17249,7 @@
                   <a:tcPr marL="27432" marR="18288" marT="18288" marB="0"/>
                 </a:tc>
               </a:tr>
-              <a:tr h="157995">
+              <a:tr h="152266">
                 <a:tc>
                   <a:txBody>
                     <a:bodyPr/>
@@ -17284,11 +17302,7 @@
                       </a:pPr>
                       <a:r>
                         <a:rPr lang="en-US" sz="800" dirty="0" smtClean="0"/>
-                        <a:t>Last </a:t>
-                      </a:r>
-                      <a:r>
-                        <a:rPr lang="en-US" sz="800" dirty="0" smtClean="0"/>
-                        <a:t>server</a:t>
+                        <a:t>Last server</a:t>
                       </a:r>
                       <a:r>
                         <a:rPr lang="en-US" sz="800" baseline="0" dirty="0" smtClean="0"/>
@@ -17298,13 +17312,12 @@
                         <a:rPr lang="en-US" sz="800" dirty="0" smtClean="0"/>
                         <a:t>message</a:t>
                       </a:r>
-                      <a:endParaRPr lang="en-US" sz="800" dirty="0" smtClean="0"/>
-                    </a:p>
-                  </a:txBody>
-                  <a:tcPr marL="27432" marR="18288" marT="18288" marB="0"/>
-                </a:tc>
-              </a:tr>
-              <a:tr h="157995">
+                    </a:p>
+                  </a:txBody>
+                  <a:tcPr marL="27432" marR="18288" marT="18288" marB="0"/>
+                </a:tc>
+              </a:tr>
+              <a:tr h="152266">
                 <a:tc>
                   <a:txBody>
                     <a:bodyPr/>
@@ -17357,19 +17370,14 @@
                       </a:pPr>
                       <a:r>
                         <a:rPr lang="en-US" sz="800" dirty="0" smtClean="0"/>
-                        <a:t>Message transmission path, </a:t>
-                      </a:r>
-                      <a:r>
-                        <a:rPr lang="en-US" sz="800" dirty="0" smtClean="0"/>
-                        <a:t>from headers</a:t>
-                      </a:r>
-                      <a:endParaRPr lang="en-US" sz="800" dirty="0" smtClean="0"/>
-                    </a:p>
-                  </a:txBody>
-                  <a:tcPr marL="27432" marR="18288" marT="18288" marB="0"/>
-                </a:tc>
-              </a:tr>
-              <a:tr h="157995">
+                        <a:t>Message transmission path, from headers</a:t>
+                      </a:r>
+                    </a:p>
+                  </a:txBody>
+                  <a:tcPr marL="27432" marR="18288" marT="18288" marB="0"/>
+                </a:tc>
+              </a:tr>
+              <a:tr h="152266">
                 <a:tc>
                   <a:txBody>
                     <a:bodyPr/>
@@ -17422,27 +17430,14 @@
                       </a:pPr>
                       <a:r>
                         <a:rPr lang="en-US" sz="800" dirty="0" smtClean="0"/>
-                        <a:t>Value of the </a:t>
-                      </a:r>
-                      <a:r>
-                        <a:rPr lang="en-US" sz="800" dirty="0" smtClean="0"/>
-                        <a:t>client User</a:t>
-                      </a:r>
-                      <a:r>
-                        <a:rPr lang="en-US" sz="800" dirty="0" smtClean="0"/>
-                        <a:t>-Agent </a:t>
-                      </a:r>
-                      <a:r>
-                        <a:rPr lang="en-US" sz="800" dirty="0" smtClean="0"/>
-                        <a:t>header</a:t>
-                      </a:r>
-                      <a:endParaRPr lang="en-US" sz="800" dirty="0" smtClean="0"/>
-                    </a:p>
-                  </a:txBody>
-                  <a:tcPr marL="27432" marR="18288" marT="18288" marB="0"/>
-                </a:tc>
-              </a:tr>
-              <a:tr h="157995">
+                        <a:t>Value of the client User-Agent header</a:t>
+                      </a:r>
+                    </a:p>
+                  </a:txBody>
+                  <a:tcPr marL="27432" marR="18288" marT="18288" marB="0"/>
+                </a:tc>
+              </a:tr>
+              <a:tr h="152266">
                 <a:tc>
                   <a:txBody>
                     <a:bodyPr/>
@@ -17507,7 +17502,7 @@
                   <a:tcPr marL="27432" marR="18288" marT="18288" marB="0"/>
                 </a:tc>
               </a:tr>
-              <a:tr h="157995">
+              <a:tr h="152266">
                 <a:tc>
                   <a:txBody>
                     <a:bodyPr/>
@@ -17560,17 +17555,8 @@
                       </a:pPr>
                       <a:r>
                         <a:rPr lang="en-US" sz="800" dirty="0" smtClean="0"/>
-                        <a:t>If </a:t>
-                      </a:r>
-                      <a:r>
-                        <a:rPr lang="en-US" sz="800" dirty="0" smtClean="0"/>
-                        <a:t>the message was sent </a:t>
-                      </a:r>
-                      <a:r>
-                        <a:rPr lang="en-US" sz="800" dirty="0" smtClean="0"/>
-                        <a:t>via webmail</a:t>
-                      </a:r>
-                      <a:endParaRPr lang="en-US" sz="800" dirty="0" smtClean="0"/>
+                        <a:t>If the message was sent via webmail</a:t>
+                      </a:r>
                     </a:p>
                   </a:txBody>
                   <a:tcPr marL="27432" marR="18288" marT="18288" marB="0"/>
@@ -18141,14 +18127,14 @@
           <p:nvPr>
             <p:extLst>
               <p:ext uri="{D42A27DB-BD31-4B8C-83A1-F6EECF244321}">
-                <p14:modId xmlns:p14="http://schemas.microsoft.com/office/powerpoint/2010/main" val="636338453"/>
+                <p14:modId xmlns:p14="http://schemas.microsoft.com/office/powerpoint/2010/main" val="1923596486"/>
               </p:ext>
             </p:extLst>
           </p:nvPr>
         </p:nvGraphicFramePr>
         <p:xfrm>
-          <a:off x="3286235" y="4419600"/>
-          <a:ext cx="3800365" cy="1946942"/>
+          <a:off x="3276600" y="4800600"/>
+          <a:ext cx="3800365" cy="2057397"/>
         </p:xfrm>
         <a:graphic>
           <a:graphicData uri="http://schemas.openxmlformats.org/drawingml/2006/table">
@@ -18161,7 +18147,7 @@
                 <a:gridCol w="481221"/>
                 <a:gridCol w="2637815"/>
               </a:tblGrid>
-              <a:tr h="254379">
+              <a:tr h="268811">
                 <a:tc>
                   <a:txBody>
                     <a:bodyPr/>
@@ -18205,7 +18191,7 @@
                   <a:tcPr marL="27432" marR="18288" marT="18288" marB="0"/>
                 </a:tc>
               </a:tr>
-              <a:tr h="168563">
+              <a:tr h="178126">
                 <a:tc>
                   <a:txBody>
                     <a:bodyPr/>
@@ -18249,7 +18235,7 @@
                   <a:tcPr marL="27432" marR="18288" marT="18288" marB="0"/>
                 </a:tc>
               </a:tr>
-              <a:tr h="152400">
+              <a:tr h="161046">
                 <a:tc>
                   <a:txBody>
                     <a:bodyPr/>
@@ -18318,7 +18304,7 @@
                   <a:tcPr marL="27432" marR="18288" marT="18288" marB="0"/>
                 </a:tc>
               </a:tr>
-              <a:tr h="152400">
+              <a:tr h="161046">
                 <a:tc>
                   <a:txBody>
                     <a:bodyPr/>
@@ -18362,7 +18348,7 @@
                   <a:tcPr marL="27432" marR="18288" marT="18288" marB="0"/>
                 </a:tc>
               </a:tr>
-              <a:tr h="152400">
+              <a:tr h="161046">
                 <a:tc>
                   <a:txBody>
                     <a:bodyPr/>
@@ -18398,15 +18384,7 @@
                     <a:p>
                       <a:r>
                         <a:rPr lang="en-US" sz="800" dirty="0" smtClean="0"/>
-                        <a:t>Username for </a:t>
-                      </a:r>
-                      <a:r>
-                        <a:rPr lang="en-US" sz="800" dirty="0" smtClean="0"/>
-                        <a:t>the proxy</a:t>
-                      </a:r>
-                      <a:r>
-                        <a:rPr lang="en-US" sz="800" dirty="0" smtClean="0"/>
-                        <a:t>, if available</a:t>
+                        <a:t>Username for the proxy, if available</a:t>
                       </a:r>
                       <a:endParaRPr lang="en-US" sz="800" dirty="0"/>
                     </a:p>
@@ -18414,7 +18392,7 @@
                   <a:tcPr marL="27432" marR="18288" marT="18288" marB="0"/>
                 </a:tc>
               </a:tr>
-              <a:tr h="152400">
+              <a:tr h="161046">
                 <a:tc>
                   <a:txBody>
                     <a:bodyPr/>
@@ -18461,7 +18439,7 @@
                   <a:tcPr marL="27432" marR="18288" marT="18288" marB="0"/>
                 </a:tc>
               </a:tr>
-              <a:tr h="152400">
+              <a:tr h="161046">
                 <a:tc>
                   <a:txBody>
                     <a:bodyPr/>
@@ -18504,7 +18482,7 @@
                   <a:tcPr marL="27432" marR="18288" marT="18288" marB="0"/>
                 </a:tc>
               </a:tr>
-              <a:tr h="152400">
+              <a:tr h="161046">
                 <a:tc>
                   <a:txBody>
                     <a:bodyPr/>
@@ -18551,7 +18529,7 @@
                   <a:tcPr marL="27432" marR="18288" marT="18288" marB="0"/>
                 </a:tc>
               </a:tr>
-              <a:tr h="152400">
+              <a:tr h="161046">
                 <a:tc>
                   <a:txBody>
                     <a:bodyPr/>
@@ -18593,7 +18571,7 @@
                   <a:tcPr marL="27432" marR="18288" marT="18288" marB="0"/>
                 </a:tc>
               </a:tr>
-              <a:tr h="152400">
+              <a:tr h="161046">
                 <a:tc>
                   <a:txBody>
                     <a:bodyPr/>
@@ -18636,7 +18614,7 @@
                   <a:tcPr marL="27432" marR="18288" marT="18288" marB="0"/>
                 </a:tc>
               </a:tr>
-              <a:tr h="152400">
+              <a:tr h="161046">
                 <a:tc>
                   <a:txBody>
                     <a:bodyPr/>
@@ -18678,7 +18656,7 @@
                   <a:tcPr marL="27432" marR="18288" marT="18288" marB="0"/>
                 </a:tc>
               </a:tr>
-              <a:tr h="152400">
+              <a:tr h="161046">
                 <a:tc>
                   <a:txBody>
                     <a:bodyPr/>
@@ -18732,7 +18710,7 @@
         </p:nvSpPr>
         <p:spPr>
           <a:xfrm>
-            <a:off x="3200400" y="3962400"/>
+            <a:off x="3190765" y="4343400"/>
             <a:ext cx="1844467" cy="461665"/>
           </a:xfrm>
           <a:prstGeom prst="rect">
@@ -18802,13 +18780,13 @@
           <p:nvPr>
             <p:extLst>
               <p:ext uri="{D42A27DB-BD31-4B8C-83A1-F6EECF244321}">
-                <p14:modId xmlns:p14="http://schemas.microsoft.com/office/powerpoint/2010/main" val="726672239"/>
+                <p14:modId xmlns:p14="http://schemas.microsoft.com/office/powerpoint/2010/main" val="3950588917"/>
               </p:ext>
             </p:extLst>
           </p:nvPr>
         </p:nvGraphicFramePr>
         <p:xfrm>
-          <a:off x="3276601" y="7391400"/>
+          <a:off x="3276601" y="7315200"/>
           <a:ext cx="3733798" cy="2006080"/>
         </p:xfrm>
         <a:graphic>
@@ -19529,7 +19507,7 @@
         </p:nvSpPr>
         <p:spPr>
           <a:xfrm>
-            <a:off x="3200400" y="6934200"/>
+            <a:off x="3200400" y="6858000"/>
             <a:ext cx="3467378" cy="461665"/>
           </a:xfrm>
           <a:prstGeom prst="rect">
@@ -19614,11 +19592,7 @@
           <a:p>
             <a:r>
               <a:rPr lang="en-US" sz="800" dirty="0" smtClean="0"/>
-              <a:t>Version: </a:t>
-            </a:r>
-            <a:r>
-              <a:rPr lang="en-US" sz="800" dirty="0" smtClean="0"/>
-              <a:t>2.0</a:t>
+              <a:t>Version: 2.0</a:t>
             </a:r>
             <a:endParaRPr lang="en-US" sz="800" dirty="0"/>
           </a:p>
@@ -19703,14 +19677,14 @@
           <p:nvPr>
             <p:extLst>
               <p:ext uri="{D42A27DB-BD31-4B8C-83A1-F6EECF244321}">
-                <p14:modId xmlns:p14="http://schemas.microsoft.com/office/powerpoint/2010/main" val="3977393084"/>
+                <p14:modId xmlns:p14="http://schemas.microsoft.com/office/powerpoint/2010/main" val="2113811538"/>
               </p:ext>
             </p:extLst>
           </p:nvPr>
         </p:nvGraphicFramePr>
         <p:xfrm>
-          <a:off x="3295143" y="891415"/>
-          <a:ext cx="3791457" cy="1753621"/>
+          <a:off x="3295143" y="2437379"/>
+          <a:ext cx="3791457" cy="1906021"/>
         </p:xfrm>
         <a:graphic>
           <a:graphicData uri="http://schemas.openxmlformats.org/drawingml/2006/table">
@@ -19723,7 +19697,7 @@
                 <a:gridCol w="476833"/>
                 <a:gridCol w="2470346"/>
               </a:tblGrid>
-              <a:tr h="161171">
+              <a:tr h="185522">
                 <a:tc>
                   <a:txBody>
                     <a:bodyPr/>
@@ -19767,7 +19741,7 @@
                   <a:tcPr marL="27432" marR="18288" marT="18288" marB="0"/>
                 </a:tc>
               </a:tr>
-              <a:tr h="143903">
+              <a:tr h="156409">
                 <a:tc>
                   <a:txBody>
                     <a:bodyPr/>
@@ -19809,11 +19783,7 @@
                     <a:p>
                       <a:r>
                         <a:rPr lang="en-US" sz="800" dirty="0" smtClean="0"/>
-                        <a:t>Timestamp </a:t>
-                      </a:r>
-                      <a:r>
-                        <a:rPr lang="en-US" sz="800" dirty="0" smtClean="0"/>
-                        <a:t>when the message </a:t>
+                        <a:t>Timestamp when the message </a:t>
                       </a:r>
                       <a:r>
                         <a:rPr lang="en-US" sz="800" baseline="0" dirty="0" smtClean="0"/>
@@ -19825,7 +19795,7 @@
                   <a:tcPr marL="27432" marR="18288" marT="18288" marB="0"/>
                 </a:tc>
               </a:tr>
-              <a:tr h="143903">
+              <a:tr h="156409">
                 <a:tc>
                   <a:txBody>
                     <a:bodyPr/>
@@ -19894,7 +19864,7 @@
                   <a:tcPr marL="27432" marR="18288" marT="18288" marB="0"/>
                 </a:tc>
               </a:tr>
-              <a:tr h="143903">
+              <a:tr h="156409">
                 <a:tc>
                   <a:txBody>
                     <a:bodyPr/>
@@ -19967,7 +19937,7 @@
                   <a:tcPr marL="27432" marR="18288" marT="18288" marB="0"/>
                 </a:tc>
               </a:tr>
-              <a:tr h="143903">
+              <a:tr h="156409">
                 <a:tc>
                   <a:txBody>
                     <a:bodyPr/>
@@ -20030,13 +20000,12 @@
                         <a:rPr lang="en-US" sz="800" dirty="0" smtClean="0"/>
                         <a:t>SNMP version (v1, v2c, v3)</a:t>
                       </a:r>
-                      <a:endParaRPr lang="en-US" sz="800" dirty="0" smtClean="0"/>
-                    </a:p>
-                  </a:txBody>
-                  <a:tcPr marL="27432" marR="18288" marT="18288" marB="0"/>
-                </a:tc>
-              </a:tr>
-              <a:tr h="143903">
+                    </a:p>
+                  </a:txBody>
+                  <a:tcPr marL="27432" marR="18288" marT="18288" marB="0"/>
+                </a:tc>
+              </a:tr>
+              <a:tr h="156409">
                 <a:tc>
                   <a:txBody>
                     <a:bodyPr/>
@@ -20108,7 +20077,7 @@
                   <a:tcPr marL="27432" marR="18288" marT="18288" marB="0"/>
                 </a:tc>
               </a:tr>
-              <a:tr h="143903">
+              <a:tr h="156409">
                 <a:tc>
                   <a:txBody>
                     <a:bodyPr/>
@@ -20197,7 +20166,7 @@
                   <a:tcPr marL="27432" marR="18288" marT="18288" marB="0"/>
                 </a:tc>
               </a:tr>
-              <a:tr h="143903">
+              <a:tr h="156409">
                 <a:tc>
                   <a:txBody>
                     <a:bodyPr/>
@@ -20278,7 +20247,7 @@
                   <a:tcPr marL="27432" marR="18288" marT="18288" marB="0"/>
                 </a:tc>
               </a:tr>
-              <a:tr h="143903">
+              <a:tr h="156409">
                 <a:tc>
                   <a:txBody>
                     <a:bodyPr/>
@@ -20363,7 +20332,7 @@
                   <a:tcPr marL="27432" marR="18288" marT="18288" marB="0"/>
                 </a:tc>
               </a:tr>
-              <a:tr h="143903">
+              <a:tr h="156409">
                 <a:tc>
                   <a:txBody>
                     <a:bodyPr/>
@@ -20438,13 +20407,12 @@
                         <a:rPr lang="en-US" sz="800" dirty="0" smtClean="0"/>
                         <a:t> packets</a:t>
                       </a:r>
-                      <a:endParaRPr lang="en-US" sz="800" dirty="0" smtClean="0"/>
-                    </a:p>
-                  </a:txBody>
-                  <a:tcPr marL="27432" marR="18288" marT="18288" marB="0"/>
-                </a:tc>
-              </a:tr>
-              <a:tr h="143903">
+                    </a:p>
+                  </a:txBody>
+                  <a:tcPr marL="27432" marR="18288" marT="18288" marB="0"/>
+                </a:tc>
+              </a:tr>
+              <a:tr h="156409">
                 <a:tc>
                   <a:txBody>
                     <a:bodyPr/>
@@ -20507,13 +20475,12 @@
                         <a:rPr lang="en-US" sz="800" dirty="0" smtClean="0"/>
                         <a:t>A system description of the responder</a:t>
                       </a:r>
-                      <a:endParaRPr lang="en-US" sz="800" dirty="0" smtClean="0"/>
-                    </a:p>
-                  </a:txBody>
-                  <a:tcPr marL="27432" marR="18288" marT="18288" marB="0"/>
-                </a:tc>
-              </a:tr>
-              <a:tr h="143903">
+                    </a:p>
+                  </a:txBody>
+                  <a:tcPr marL="27432" marR="18288" marT="18288" marB="0"/>
+                </a:tc>
+              </a:tr>
+              <a:tr h="156409">
                 <a:tc>
                   <a:txBody>
                     <a:bodyPr/>
@@ -20598,7 +20565,7 @@
         </p:nvSpPr>
         <p:spPr>
           <a:xfrm>
-            <a:off x="3207740" y="424365"/>
+            <a:off x="3207740" y="1970329"/>
             <a:ext cx="3345461" cy="461665"/>
           </a:xfrm>
           <a:prstGeom prst="rect">
@@ -20691,13 +20658,407 @@
             </a:r>
             <a:r>
               <a:rPr lang="en-US" sz="800" dirty="0" smtClean="0"/>
-              <a:t> LLC</a:t>
-            </a:r>
-            <a:r>
-              <a:rPr lang="en-US" sz="800" dirty="0" smtClean="0"/>
-              <a:t>. </a:t>
+              <a:t> LLC. </a:t>
             </a:r>
             <a:endParaRPr lang="en-US" sz="800" dirty="0"/>
+          </a:p>
+        </p:txBody>
+      </p:sp>
+      <p:graphicFrame>
+        <p:nvGraphicFramePr>
+          <p:cNvPr id="20" name="Table 19"/>
+          <p:cNvGraphicFramePr>
+            <a:graphicFrameLocks noGrp="1"/>
+          </p:cNvGraphicFramePr>
+          <p:nvPr>
+            <p:extLst>
+              <p:ext uri="{D42A27DB-BD31-4B8C-83A1-F6EECF244321}">
+                <p14:modId xmlns:p14="http://schemas.microsoft.com/office/powerpoint/2010/main" val="3508969050"/>
+              </p:ext>
+            </p:extLst>
+          </p:nvPr>
+        </p:nvGraphicFramePr>
+        <p:xfrm>
+          <a:off x="3295142" y="1152850"/>
+          <a:ext cx="3791459" cy="828350"/>
+        </p:xfrm>
+        <a:graphic>
+          <a:graphicData uri="http://schemas.openxmlformats.org/drawingml/2006/table">
+            <a:tbl>
+              <a:tblPr firstRow="1" bandRow="1">
+                <a:tableStyleId>{21E4AEA4-8DFA-4A89-87EB-49C32662AFE0}</a:tableStyleId>
+              </a:tblPr>
+              <a:tblGrid>
+                <a:gridCol w="686965"/>
+                <a:gridCol w="485078"/>
+                <a:gridCol w="2619416"/>
+              </a:tblGrid>
+              <a:tr h="189454">
+                <a:tc>
+                  <a:txBody>
+                    <a:bodyPr/>
+                    <a:lstStyle/>
+                    <a:p>
+                      <a:r>
+                        <a:rPr lang="en-US" sz="1000" dirty="0" smtClean="0"/>
+                        <a:t>Field</a:t>
+                      </a:r>
+                      <a:endParaRPr lang="en-US" sz="1000" b="1" dirty="0"/>
+                    </a:p>
+                  </a:txBody>
+                  <a:tcPr marL="27432" marR="18288" marT="18288" marB="0"/>
+                </a:tc>
+                <a:tc>
+                  <a:txBody>
+                    <a:bodyPr/>
+                    <a:lstStyle/>
+                    <a:p>
+                      <a:r>
+                        <a:rPr lang="en-US" sz="1000" dirty="0" smtClean="0"/>
+                        <a:t>Type</a:t>
+                      </a:r>
+                      <a:endParaRPr lang="en-US" sz="1000" b="1" dirty="0"/>
+                    </a:p>
+                  </a:txBody>
+                  <a:tcPr marL="27432" marR="18288" marT="18288" marB="0"/>
+                </a:tc>
+                <a:tc>
+                  <a:txBody>
+                    <a:bodyPr/>
+                    <a:lstStyle/>
+                    <a:p>
+                      <a:r>
+                        <a:rPr lang="en-US" sz="1000" dirty="0" smtClean="0"/>
+                        <a:t>Description</a:t>
+                      </a:r>
+                      <a:endParaRPr lang="en-US" sz="1000" b="1" dirty="0"/>
+                    </a:p>
+                  </a:txBody>
+                  <a:tcPr marL="27432" marR="18288" marT="18288" marB="0"/>
+                </a:tc>
+              </a:tr>
+              <a:tr h="159724">
+                <a:tc>
+                  <a:txBody>
+                    <a:bodyPr/>
+                    <a:lstStyle/>
+                    <a:p>
+                      <a:r>
+                        <a:rPr lang="en-US" sz="800" b="1" dirty="0" err="1" smtClean="0"/>
+                        <a:t>ts</a:t>
+                      </a:r>
+                      <a:endParaRPr lang="en-US" sz="800" b="1" dirty="0"/>
+                    </a:p>
+                  </a:txBody>
+                  <a:tcPr marL="27432" marR="18288" marT="18288" marB="0"/>
+                </a:tc>
+                <a:tc>
+                  <a:txBody>
+                    <a:bodyPr/>
+                    <a:lstStyle/>
+                    <a:p>
+                      <a:r>
+                        <a:rPr lang="en-US" sz="800" baseline="0" dirty="0" smtClean="0"/>
+                        <a:t>time</a:t>
+                      </a:r>
+                      <a:endParaRPr lang="en-US" sz="800" b="0" dirty="0">
+                        <a:solidFill>
+                          <a:schemeClr val="accent4">
+                            <a:lumMod val="75000"/>
+                          </a:schemeClr>
+                        </a:solidFill>
+                      </a:endParaRPr>
+                    </a:p>
+                  </a:txBody>
+                  <a:tcPr marL="27432" marR="18288" marT="18288" marB="0"/>
+                </a:tc>
+                <a:tc>
+                  <a:txBody>
+                    <a:bodyPr/>
+                    <a:lstStyle/>
+                    <a:p>
+                      <a:r>
+                        <a:rPr lang="en-US" sz="800" dirty="0" smtClean="0"/>
+                        <a:t>Timestamp of request</a:t>
+                      </a:r>
+                      <a:endParaRPr lang="en-US" sz="800" dirty="0"/>
+                    </a:p>
+                  </a:txBody>
+                  <a:tcPr marL="27432" marR="18288" marT="18288" marB="0"/>
+                </a:tc>
+              </a:tr>
+              <a:tr h="159724">
+                <a:tc>
+                  <a:txBody>
+                    <a:bodyPr/>
+                    <a:lstStyle/>
+                    <a:p>
+                      <a:r>
+                        <a:rPr lang="en-US" sz="800" b="1" baseline="0" dirty="0" err="1" smtClean="0"/>
+                        <a:t>uid</a:t>
+                      </a:r>
+                      <a:r>
+                        <a:rPr lang="en-US" sz="800" b="1" baseline="0" dirty="0" smtClean="0"/>
+                        <a:t> &amp; id</a:t>
+                      </a:r>
+                      <a:endParaRPr lang="en-US" sz="800" b="1" baseline="0" dirty="0"/>
+                    </a:p>
+                  </a:txBody>
+                  <a:tcPr marL="27432" marR="18288" marT="18288" marB="0"/>
+                </a:tc>
+                <a:tc>
+                  <a:txBody>
+                    <a:bodyPr/>
+                    <a:lstStyle/>
+                    <a:p>
+                      <a:endParaRPr lang="en-US" sz="800" b="0" baseline="0" dirty="0"/>
+                    </a:p>
+                  </a:txBody>
+                  <a:tcPr marL="27432" marR="18288" marT="18288" marB="0"/>
+                </a:tc>
+                <a:tc>
+                  <a:txBody>
+                    <a:bodyPr/>
+                    <a:lstStyle/>
+                    <a:p>
+                      <a:pPr marL="0" marR="0" indent="0" algn="l" defTabSz="914400" rtl="0" eaLnBrk="1" fontAlgn="auto" latinLnBrk="0" hangingPunct="1">
+                        <a:lnSpc>
+                          <a:spcPct val="100000"/>
+                        </a:lnSpc>
+                        <a:spcBef>
+                          <a:spcPts val="0"/>
+                        </a:spcBef>
+                        <a:spcAft>
+                          <a:spcPts val="0"/>
+                        </a:spcAft>
+                        <a:buClrTx/>
+                        <a:buSzTx/>
+                        <a:buFontTx/>
+                        <a:buNone/>
+                        <a:tabLst/>
+                        <a:defRPr/>
+                      </a:pPr>
+                      <a:r>
+                        <a:rPr lang="en-US" sz="800" baseline="0" dirty="0" smtClean="0"/>
+                        <a:t>Underlying connection info - See </a:t>
+                      </a:r>
+                      <a:r>
+                        <a:rPr lang="en-US" sz="800" b="1" baseline="0" dirty="0" smtClean="0">
+                          <a:solidFill>
+                            <a:srgbClr val="9CB95D"/>
+                          </a:solidFill>
+                        </a:rPr>
+                        <a:t>conn.log</a:t>
+                      </a:r>
+                      <a:endParaRPr lang="en-US" sz="800" baseline="0" dirty="0" smtClean="0"/>
+                    </a:p>
+                  </a:txBody>
+                  <a:tcPr marL="27432" marR="18288" marT="18288" marB="0"/>
+                </a:tc>
+              </a:tr>
+              <a:tr h="159724">
+                <a:tc>
+                  <a:txBody>
+                    <a:bodyPr/>
+                    <a:lstStyle/>
+                    <a:p>
+                      <a:r>
+                        <a:rPr lang="en-US" sz="800" b="1" dirty="0" err="1" smtClean="0"/>
+                        <a:t>func</a:t>
+                      </a:r>
+                      <a:endParaRPr lang="en-US" sz="800" b="1" dirty="0"/>
+                    </a:p>
+                  </a:txBody>
+                  <a:tcPr marL="27432" marR="18288" marT="18288" marB="0"/>
+                </a:tc>
+                <a:tc>
+                  <a:txBody>
+                    <a:bodyPr/>
+                    <a:lstStyle/>
+                    <a:p>
+                      <a:r>
+                        <a:rPr lang="en-US" sz="800" dirty="0" smtClean="0"/>
+                        <a:t>string</a:t>
+                      </a:r>
+                      <a:endParaRPr lang="en-US" sz="800" b="0" dirty="0">
+                        <a:solidFill>
+                          <a:schemeClr val="tx1"/>
+                        </a:solidFill>
+                      </a:endParaRPr>
+                    </a:p>
+                  </a:txBody>
+                  <a:tcPr marL="27432" marR="18288" marT="18288" marB="0"/>
+                </a:tc>
+                <a:tc>
+                  <a:txBody>
+                    <a:bodyPr/>
+                    <a:lstStyle/>
+                    <a:p>
+                      <a:pPr marL="0" marR="0" indent="0" algn="l" defTabSz="914400" rtl="0" eaLnBrk="1" fontAlgn="auto" latinLnBrk="0" hangingPunct="1">
+                        <a:lnSpc>
+                          <a:spcPct val="100000"/>
+                        </a:lnSpc>
+                        <a:spcBef>
+                          <a:spcPts val="0"/>
+                        </a:spcBef>
+                        <a:spcAft>
+                          <a:spcPts val="0"/>
+                        </a:spcAft>
+                        <a:buClrTx/>
+                        <a:buSzTx/>
+                        <a:buFontTx/>
+                        <a:buNone/>
+                        <a:tabLst/>
+                        <a:defRPr/>
+                      </a:pPr>
+                      <a:r>
+                        <a:rPr lang="en-US" sz="800" dirty="0" smtClean="0"/>
+                        <a:t>Function message that was sent</a:t>
+                      </a:r>
+                    </a:p>
+                  </a:txBody>
+                  <a:tcPr marL="27432" marR="18288" marT="18288" marB="0"/>
+                </a:tc>
+              </a:tr>
+              <a:tr h="159724">
+                <a:tc>
+                  <a:txBody>
+                    <a:bodyPr/>
+                    <a:lstStyle/>
+                    <a:p>
+                      <a:r>
+                        <a:rPr lang="en-US" sz="800" b="1" dirty="0" smtClean="0"/>
+                        <a:t>exception</a:t>
+                      </a:r>
+                      <a:endParaRPr lang="en-US" sz="800" b="1" dirty="0"/>
+                    </a:p>
+                  </a:txBody>
+                  <a:tcPr marL="27432" marR="18288" marT="18288" marB="0"/>
+                </a:tc>
+                <a:tc>
+                  <a:txBody>
+                    <a:bodyPr/>
+                    <a:lstStyle/>
+                    <a:p>
+                      <a:r>
+                        <a:rPr lang="en-US" sz="800" dirty="0" smtClean="0"/>
+                        <a:t>string</a:t>
+                      </a:r>
+                      <a:endParaRPr lang="en-US" sz="800" b="0" dirty="0">
+                        <a:solidFill>
+                          <a:schemeClr val="tx1"/>
+                        </a:solidFill>
+                      </a:endParaRPr>
+                    </a:p>
+                  </a:txBody>
+                  <a:tcPr marL="27432" marR="18288" marT="18288" marB="0"/>
+                </a:tc>
+                <a:tc>
+                  <a:txBody>
+                    <a:bodyPr/>
+                    <a:lstStyle/>
+                    <a:p>
+                      <a:pPr marL="0" marR="0" indent="0" algn="l" defTabSz="914400" rtl="0" eaLnBrk="1" fontAlgn="auto" latinLnBrk="0" hangingPunct="1">
+                        <a:lnSpc>
+                          <a:spcPct val="100000"/>
+                        </a:lnSpc>
+                        <a:spcBef>
+                          <a:spcPts val="0"/>
+                        </a:spcBef>
+                        <a:spcAft>
+                          <a:spcPts val="0"/>
+                        </a:spcAft>
+                        <a:buClrTx/>
+                        <a:buSzTx/>
+                        <a:buFontTx/>
+                        <a:buNone/>
+                        <a:tabLst/>
+                        <a:defRPr/>
+                      </a:pPr>
+                      <a:r>
+                        <a:rPr lang="en-US" sz="800" dirty="0" smtClean="0"/>
+                        <a:t>Exception if there</a:t>
+                      </a:r>
+                      <a:r>
+                        <a:rPr lang="en-US" sz="800" baseline="0" dirty="0" smtClean="0"/>
+                        <a:t> was a failure</a:t>
+                      </a:r>
+                      <a:endParaRPr lang="en-US" sz="800" dirty="0" smtClean="0"/>
+                    </a:p>
+                  </a:txBody>
+                  <a:tcPr marL="27432" marR="18288" marT="18288" marB="0"/>
+                </a:tc>
+              </a:tr>
+            </a:tbl>
+          </a:graphicData>
+        </a:graphic>
+      </p:graphicFrame>
+      <p:sp>
+        <p:nvSpPr>
+          <p:cNvPr id="21" name="TextBox 20"/>
+          <p:cNvSpPr txBox="1"/>
+          <p:nvPr/>
+        </p:nvSpPr>
+        <p:spPr>
+          <a:xfrm>
+            <a:off x="3200400" y="685800"/>
+            <a:ext cx="2539313" cy="461665"/>
+          </a:xfrm>
+          <a:prstGeom prst="rect">
+            <a:avLst/>
+          </a:prstGeom>
+          <a:noFill/>
+        </p:spPr>
+        <p:txBody>
+          <a:bodyPr wrap="square" rtlCol="0">
+            <a:spAutoFit/>
+          </a:bodyPr>
+          <a:lstStyle/>
+          <a:p>
+            <a:r>
+              <a:rPr lang="en-US" sz="1400" dirty="0" err="1" smtClean="0">
+                <a:solidFill>
+                  <a:schemeClr val="accent2">
+                    <a:lumMod val="60000"/>
+                    <a:lumOff val="40000"/>
+                  </a:schemeClr>
+                </a:solidFill>
+                <a:latin typeface="Arial Black" pitchFamily="34" charset="0"/>
+              </a:rPr>
+              <a:t>modbus.log</a:t>
+            </a:r>
+            <a:endParaRPr lang="en-US" sz="1400" dirty="0" smtClean="0">
+              <a:solidFill>
+                <a:schemeClr val="accent2">
+                  <a:lumMod val="60000"/>
+                  <a:lumOff val="40000"/>
+                </a:schemeClr>
+              </a:solidFill>
+              <a:latin typeface="Arial Black" pitchFamily="34" charset="0"/>
+            </a:endParaRPr>
+          </a:p>
+          <a:p>
+            <a:r>
+              <a:rPr lang="en-US" sz="1000" dirty="0" smtClean="0">
+                <a:solidFill>
+                  <a:schemeClr val="accent2">
+                    <a:lumMod val="60000"/>
+                    <a:lumOff val="40000"/>
+                  </a:schemeClr>
+                </a:solidFill>
+                <a:latin typeface="Arial Black" pitchFamily="34" charset="0"/>
+              </a:rPr>
+              <a:t>PLC requests (industrial control)</a:t>
+            </a:r>
+            <a:endParaRPr lang="en-US" sz="1000" dirty="0">
+              <a:solidFill>
+                <a:schemeClr val="accent2">
+                  <a:lumMod val="60000"/>
+                  <a:lumOff val="40000"/>
+                </a:schemeClr>
+              </a:solidFill>
+              <a:latin typeface="Arial Black" pitchFamily="34" charset="0"/>
+            </a:endParaRPr>
           </a:p>
         </p:txBody>
       </p:sp>
@@ -20740,13 +21101,13 @@
           <p:nvPr>
             <p:extLst>
               <p:ext uri="{D42A27DB-BD31-4B8C-83A1-F6EECF244321}">
-                <p14:modId xmlns:p14="http://schemas.microsoft.com/office/powerpoint/2010/main" val="1132082762"/>
+                <p14:modId xmlns:p14="http://schemas.microsoft.com/office/powerpoint/2010/main" val="4214259002"/>
               </p:ext>
             </p:extLst>
           </p:nvPr>
         </p:nvGraphicFramePr>
         <p:xfrm>
-          <a:off x="152400" y="2673069"/>
+          <a:off x="152400" y="2536609"/>
           <a:ext cx="3581401" cy="3346731"/>
         </p:xfrm>
         <a:graphic>
@@ -21269,23 +21630,7 @@
                             <a:schemeClr val="tx1"/>
                           </a:solidFill>
                         </a:rPr>
-                        <a:t> </a:t>
-                      </a:r>
-                      <a:r>
-                        <a:rPr lang="en-US" sz="800" b="0" baseline="0" dirty="0" smtClean="0">
-                          <a:solidFill>
-                            <a:schemeClr val="tx1"/>
-                          </a:solidFill>
-                        </a:rPr>
-                        <a:t>client </a:t>
-                      </a:r>
-                      <a:r>
-                        <a:rPr lang="en-US" sz="800" b="0" baseline="0" dirty="0" smtClean="0">
-                          <a:solidFill>
-                            <a:schemeClr val="tx1"/>
-                          </a:solidFill>
-                        </a:rPr>
-                        <a:t>for session resumption</a:t>
+                        <a:t> client for session resumption</a:t>
                       </a:r>
                       <a:endParaRPr lang="en-US" sz="800" b="0" dirty="0">
                         <a:solidFill>
@@ -21843,31 +22188,7 @@
                             <a:schemeClr val="tx1"/>
                           </a:solidFill>
                         </a:rPr>
-                        <a:t>Subject of the </a:t>
-                      </a:r>
-                      <a:r>
-                        <a:rPr lang="en-US" sz="800" b="0" dirty="0" smtClean="0">
-                          <a:solidFill>
-                            <a:schemeClr val="tx1"/>
-                          </a:solidFill>
-                        </a:rPr>
-                        <a:t>signer </a:t>
-                      </a:r>
-                      <a:r>
-                        <a:rPr lang="en-US" sz="800" b="0" dirty="0" smtClean="0">
-                          <a:solidFill>
-                            <a:schemeClr val="tx1"/>
-                          </a:solidFill>
-                        </a:rPr>
-                        <a:t>of the </a:t>
-                      </a:r>
-                      <a:r>
-                        <a:rPr lang="en-US" sz="800" b="0" dirty="0" smtClean="0">
-                          <a:solidFill>
-                            <a:schemeClr val="tx1"/>
-                          </a:solidFill>
-                        </a:rPr>
-                        <a:t>server cert</a:t>
+                        <a:t>Subject of the signer of the server cert</a:t>
                       </a:r>
                       <a:endParaRPr lang="en-US" sz="800" b="0" dirty="0">
                         <a:solidFill>
@@ -21995,15 +22316,7 @@
                             <a:schemeClr val="tx1"/>
                           </a:solidFill>
                         </a:rPr>
-                        <a:t>Subject of the signer of the </a:t>
-                      </a:r>
-                      <a:r>
-                        <a:rPr lang="en-US" sz="800" b="0" dirty="0" smtClean="0">
-                          <a:solidFill>
-                            <a:schemeClr val="tx1"/>
-                          </a:solidFill>
-                        </a:rPr>
-                        <a:t>client cert</a:t>
+                        <a:t>Subject of the signer of the client cert</a:t>
                       </a:r>
                       <a:endParaRPr lang="en-US" sz="800" b="0" dirty="0">
                         <a:solidFill>
@@ -22215,7 +22528,7 @@
         </p:nvSpPr>
         <p:spPr>
           <a:xfrm>
-            <a:off x="66565" y="2270060"/>
+            <a:off x="66565" y="2133600"/>
             <a:ext cx="1334758" cy="461665"/>
           </a:xfrm>
           <a:prstGeom prst="rect">
@@ -22301,9 +22614,7 @@
             <a:r>
               <a:rPr lang="en-US" sz="2400" dirty="0" smtClean="0">
                 <a:solidFill>
-                  <a:schemeClr val="bg1">
-                    <a:lumMod val="75000"/>
-                  </a:schemeClr>
+                  <a:srgbClr val="006699"/>
                 </a:solidFill>
                 <a:latin typeface="Arial Black" pitchFamily="34" charset="0"/>
               </a:rPr>
@@ -22311,9 +22622,7 @@
             </a:r>
             <a:endParaRPr lang="en-US" sz="2400" dirty="0">
               <a:solidFill>
-                <a:schemeClr val="bg1">
-                  <a:lumMod val="75000"/>
-                </a:schemeClr>
+                <a:srgbClr val="006699"/>
               </a:solidFill>
               <a:latin typeface="Arial Black" pitchFamily="34" charset="0"/>
             </a:endParaRPr>
@@ -22359,14 +22668,14 @@
           <p:nvPr>
             <p:extLst>
               <p:ext uri="{D42A27DB-BD31-4B8C-83A1-F6EECF244321}">
-                <p14:modId xmlns:p14="http://schemas.microsoft.com/office/powerpoint/2010/main" val="3545642253"/>
+                <p14:modId xmlns:p14="http://schemas.microsoft.com/office/powerpoint/2010/main" val="4188185051"/>
               </p:ext>
             </p:extLst>
           </p:nvPr>
         </p:nvGraphicFramePr>
         <p:xfrm>
-          <a:off x="3962400" y="2959039"/>
-          <a:ext cx="3124200" cy="3670361"/>
+          <a:off x="3886200" y="2652309"/>
+          <a:ext cx="3200400" cy="3779205"/>
         </p:xfrm>
         <a:graphic>
           <a:graphicData uri="http://schemas.openxmlformats.org/drawingml/2006/table">
@@ -22375,11 +22684,11 @@
                 <a:tableStyleId>{21E4AEA4-8DFA-4A89-87EB-49C32662AFE0}</a:tableStyleId>
               </a:tblPr>
               <a:tblGrid>
-                <a:gridCol w="1243489"/>
-                <a:gridCol w="509111"/>
-                <a:gridCol w="1371600"/>
+                <a:gridCol w="1273818"/>
+                <a:gridCol w="521528"/>
+                <a:gridCol w="1405054"/>
               </a:tblGrid>
-              <a:tr h="190499">
+              <a:tr h="201645">
                 <a:tc>
                   <a:txBody>
                     <a:bodyPr/>
@@ -22423,7 +22732,7 @@
                   <a:tcPr marL="27432" marR="9144" marT="18288" marB="0"/>
                 </a:tc>
               </a:tr>
-              <a:tr h="162090">
+              <a:tr h="171573">
                 <a:tc>
                   <a:txBody>
                     <a:bodyPr/>
@@ -22459,23 +22768,11 @@
                     <a:p>
                       <a:r>
                         <a:rPr lang="en-US" sz="800" dirty="0" smtClean="0"/>
-                        <a:t>Time when </a:t>
-                      </a:r>
-                      <a:r>
-                        <a:rPr lang="en-US" sz="800" dirty="0" smtClean="0"/>
-                        <a:t>the </a:t>
-                      </a:r>
-                      <a:r>
-                        <a:rPr lang="en-US" sz="800" dirty="0" smtClean="0"/>
-                        <a:t>cert </a:t>
+                        <a:t>Time when the cert </a:t>
                       </a:r>
                       <a:r>
                         <a:rPr lang="en-US" sz="800" baseline="0" dirty="0" smtClean="0"/>
-                        <a:t>was </a:t>
-                      </a:r>
-                      <a:r>
-                        <a:rPr lang="en-US" sz="800" baseline="0" dirty="0" smtClean="0"/>
-                        <a:t>seen</a:t>
+                        <a:t>was seen</a:t>
                       </a:r>
                       <a:endParaRPr lang="en-US" sz="800" dirty="0"/>
                     </a:p>
@@ -22483,7 +22780,7 @@
                   <a:tcPr marL="27432" marR="18288" marT="18288" marB="0"/>
                 </a:tc>
               </a:tr>
-              <a:tr h="162090">
+              <a:tr h="171573">
                 <a:tc>
                   <a:txBody>
                     <a:bodyPr/>
@@ -22562,7 +22859,7 @@
                   <a:tcPr marL="27432" marR="18288" marT="18288" marB="0"/>
                 </a:tc>
               </a:tr>
-              <a:tr h="162090">
+              <a:tr h="171573">
                 <a:tc>
                   <a:txBody>
                     <a:bodyPr/>
@@ -22606,7 +22903,7 @@
                   <a:tcPr marL="27432" marR="18288" marT="18288" marB="0"/>
                 </a:tc>
               </a:tr>
-              <a:tr h="162090">
+              <a:tr h="171573">
                 <a:tc>
                   <a:txBody>
                     <a:bodyPr/>
@@ -22650,7 +22947,7 @@
                   <a:tcPr marL="27432" marR="18288" marT="18288" marB="0"/>
                 </a:tc>
               </a:tr>
-              <a:tr h="162090">
+              <a:tr h="171573">
                 <a:tc>
                   <a:txBody>
                     <a:bodyPr/>
@@ -22694,7 +22991,7 @@
                   <a:tcPr marL="27432" marR="18288" marT="18288" marB="0"/>
                 </a:tc>
               </a:tr>
-              <a:tr h="162090">
+              <a:tr h="277464">
                 <a:tc>
                   <a:txBody>
                     <a:bodyPr/>
@@ -22742,7 +23039,7 @@
                   <a:tcPr marL="27432" marR="18288" marT="18288" marB="0"/>
                 </a:tc>
               </a:tr>
-              <a:tr h="162090">
+              <a:tr h="277464">
                 <a:tc>
                   <a:txBody>
                     <a:bodyPr/>
@@ -22786,7 +23083,7 @@
                   <a:tcPr marL="27432" marR="18288" marT="18288" marB="0"/>
                 </a:tc>
               </a:tr>
-              <a:tr h="162090">
+              <a:tr h="171573">
                 <a:tc>
                   <a:txBody>
                     <a:bodyPr/>
@@ -22830,7 +23127,7 @@
                   <a:tcPr marL="27432" marR="18288" marT="18288" marB="0"/>
                 </a:tc>
               </a:tr>
-              <a:tr h="162090">
+              <a:tr h="171573">
                 <a:tc>
                   <a:txBody>
                     <a:bodyPr/>
@@ -22878,7 +23175,7 @@
                   <a:tcPr marL="27432" marR="18288" marT="18288" marB="0"/>
                 </a:tc>
               </a:tr>
-              <a:tr h="162090">
+              <a:tr h="171573">
                 <a:tc>
                   <a:txBody>
                     <a:bodyPr/>
@@ -22926,7 +23223,7 @@
                   <a:tcPr marL="27432" marR="18288" marT="18288" marB="0"/>
                 </a:tc>
               </a:tr>
-              <a:tr h="162090">
+              <a:tr h="171573">
                 <a:tc>
                   <a:txBody>
                     <a:bodyPr/>
@@ -22974,7 +23271,7 @@
                   <a:tcPr marL="27432" marR="18288" marT="18288" marB="0"/>
                 </a:tc>
               </a:tr>
-              <a:tr h="162090">
+              <a:tr h="171573">
                 <a:tc>
                   <a:txBody>
                     <a:bodyPr/>
@@ -23018,7 +23315,7 @@
                   <a:tcPr marL="27432" marR="18288" marT="18288" marB="0"/>
                 </a:tc>
               </a:tr>
-              <a:tr h="162090">
+              <a:tr h="171573">
                 <a:tc>
                   <a:txBody>
                     <a:bodyPr/>
@@ -23062,7 +23359,7 @@
                   <a:tcPr marL="27432" marR="18288" marT="18288" marB="0"/>
                 </a:tc>
               </a:tr>
-              <a:tr h="162090">
+              <a:tr h="277464">
                 <a:tc>
                   <a:txBody>
                     <a:bodyPr/>
@@ -23110,7 +23407,7 @@
                   <a:tcPr marL="27432" marR="18288" marT="18288" marB="0"/>
                 </a:tc>
               </a:tr>
-              <a:tr h="162090">
+              <a:tr h="171573">
                 <a:tc>
                   <a:txBody>
                     <a:bodyPr/>
@@ -23154,7 +23451,7 @@
                   <a:tcPr marL="27432" marR="18288" marT="18288" marB="0"/>
                 </a:tc>
               </a:tr>
-              <a:tr h="162090">
+              <a:tr h="171573">
                 <a:tc>
                   <a:txBody>
                     <a:bodyPr/>
@@ -23198,7 +23495,7 @@
                   <a:tcPr marL="27432" marR="18288" marT="18288" marB="0"/>
                 </a:tc>
               </a:tr>
-              <a:tr h="162090">
+              <a:tr h="171573">
                 <a:tc>
                   <a:txBody>
                     <a:bodyPr/>
@@ -23242,7 +23539,7 @@
                   <a:tcPr marL="27432" marR="18288" marT="18288" marB="0"/>
                 </a:tc>
               </a:tr>
-              <a:tr h="162090">
+              <a:tr h="171573">
                 <a:tc>
                   <a:txBody>
                     <a:bodyPr/>
@@ -23286,7 +23583,7 @@
                   <a:tcPr marL="27432" marR="18288" marT="18288" marB="0"/>
                 </a:tc>
               </a:tr>
-              <a:tr h="162090">
+              <a:tr h="171573">
                 <a:tc>
                   <a:txBody>
                     <a:bodyPr/>
@@ -23342,7 +23639,7 @@
         </p:nvSpPr>
         <p:spPr>
           <a:xfrm>
-            <a:off x="3886200" y="2471051"/>
+            <a:off x="3886200" y="2164321"/>
             <a:ext cx="2007836" cy="461665"/>
           </a:xfrm>
           <a:prstGeom prst="rect">
@@ -23368,15 +23665,6 @@
               </a:rPr>
               <a:t>x509.log</a:t>
             </a:r>
-            <a:endParaRPr lang="en-US" sz="1400" dirty="0" smtClean="0">
-              <a:solidFill>
-                <a:schemeClr val="accent2">
-                  <a:lumMod val="60000"/>
-                  <a:lumOff val="40000"/>
-                </a:schemeClr>
-              </a:solidFill>
-              <a:latin typeface="Arial Black" pitchFamily="34" charset="0"/>
-            </a:endParaRPr>
           </a:p>
           <a:p>
             <a:r>
@@ -23412,14 +23700,14 @@
           <p:nvPr>
             <p:extLst>
               <p:ext uri="{D42A27DB-BD31-4B8C-83A1-F6EECF244321}">
-                <p14:modId xmlns:p14="http://schemas.microsoft.com/office/powerpoint/2010/main" val="2689673044"/>
+                <p14:modId xmlns:p14="http://schemas.microsoft.com/office/powerpoint/2010/main" val="3626377034"/>
               </p:ext>
             </p:extLst>
           </p:nvPr>
         </p:nvGraphicFramePr>
         <p:xfrm>
-          <a:off x="162035" y="7730458"/>
-          <a:ext cx="3008883" cy="1184942"/>
+          <a:off x="162035" y="7572208"/>
+          <a:ext cx="3571765" cy="1184942"/>
         </p:xfrm>
         <a:graphic>
           <a:graphicData uri="http://schemas.openxmlformats.org/drawingml/2006/table">
@@ -23428,9 +23716,9 @@
                 <a:tableStyleId>{5C22544A-7EE6-4342-B048-85BDC9FD1C3A}</a:tableStyleId>
               </a:tblPr>
               <a:tblGrid>
-                <a:gridCol w="381000"/>
-                <a:gridCol w="320315"/>
-                <a:gridCol w="2307568"/>
+                <a:gridCol w="452275"/>
+                <a:gridCol w="380237"/>
+                <a:gridCol w="2739253"/>
               </a:tblGrid>
               <a:tr h="254379">
                 <a:tc>
@@ -23779,7 +24067,7 @@
         </p:nvSpPr>
         <p:spPr>
           <a:xfrm>
-            <a:off x="76200" y="7273258"/>
+            <a:off x="76200" y="7115008"/>
             <a:ext cx="2752835" cy="461665"/>
           </a:xfrm>
           <a:prstGeom prst="rect">
@@ -23872,11 +24160,7 @@
             </a:r>
             <a:r>
               <a:rPr lang="en-US" sz="800" dirty="0" smtClean="0"/>
-              <a:t> LLC</a:t>
-            </a:r>
-            <a:r>
-              <a:rPr lang="en-US" sz="800" dirty="0" smtClean="0"/>
-              <a:t>. </a:t>
+              <a:t> LLC. </a:t>
             </a:r>
             <a:endParaRPr lang="en-US" sz="800" dirty="0"/>
           </a:p>
@@ -23906,11 +24190,7 @@
           <a:p>
             <a:r>
               <a:rPr lang="en-US" sz="800" dirty="0" smtClean="0"/>
-              <a:t>Version: </a:t>
-            </a:r>
-            <a:r>
-              <a:rPr lang="en-US" sz="800" dirty="0" smtClean="0"/>
-              <a:t>2.0</a:t>
+              <a:t>Version: 2.0</a:t>
             </a:r>
             <a:endParaRPr lang="en-US" sz="800" dirty="0"/>
           </a:p>
@@ -24180,19 +24460,7 @@
                       </a:r>
                       <a:r>
                         <a:rPr lang="en-US" sz="800" baseline="0" dirty="0" smtClean="0"/>
-                        <a:t>“</a:t>
-                      </a:r>
-                      <a:r>
-                        <a:rPr lang="en-US" sz="800" baseline="0" dirty="0" smtClean="0"/>
-                        <a:t>success” or </a:t>
-                      </a:r>
-                      <a:r>
-                        <a:rPr lang="en-US" sz="800" baseline="0" dirty="0" smtClean="0"/>
-                        <a:t>“</a:t>
-                      </a:r>
-                      <a:r>
-                        <a:rPr lang="en-US" sz="800" baseline="0" dirty="0" smtClean="0"/>
-                        <a:t>failure”.</a:t>
+                        <a:t>“success” or “failure”.</a:t>
                       </a:r>
                       <a:endParaRPr lang="en-US" sz="800" dirty="0" smtClean="0"/>
                     </a:p>
@@ -24522,14 +24790,14 @@
           <p:nvPr>
             <p:extLst>
               <p:ext uri="{D42A27DB-BD31-4B8C-83A1-F6EECF244321}">
-                <p14:modId xmlns:p14="http://schemas.microsoft.com/office/powerpoint/2010/main" val="2446380453"/>
+                <p14:modId xmlns:p14="http://schemas.microsoft.com/office/powerpoint/2010/main" val="1038120083"/>
               </p:ext>
             </p:extLst>
           </p:nvPr>
         </p:nvGraphicFramePr>
         <p:xfrm>
-          <a:off x="163603" y="6563050"/>
-          <a:ext cx="3029458" cy="746300"/>
+          <a:off x="163602" y="6334450"/>
+          <a:ext cx="3570197" cy="746300"/>
         </p:xfrm>
         <a:graphic>
           <a:graphicData uri="http://schemas.openxmlformats.org/drawingml/2006/table">
@@ -24538,9 +24806,9 @@
                 <a:tableStyleId>{F5AB1C69-6EDB-4FF4-983F-18BD219EF322}</a:tableStyleId>
               </a:tblPr>
               <a:tblGrid>
-                <a:gridCol w="562636"/>
-                <a:gridCol w="332611"/>
-                <a:gridCol w="2134211"/>
+                <a:gridCol w="663063"/>
+                <a:gridCol w="391980"/>
+                <a:gridCol w="2515154"/>
               </a:tblGrid>
               <a:tr h="161171">
                 <a:tc>
@@ -24865,7 +25133,7 @@
         </p:nvSpPr>
         <p:spPr>
           <a:xfrm>
-            <a:off x="76200" y="6096000"/>
+            <a:off x="76200" y="5867400"/>
             <a:ext cx="3345461" cy="461665"/>
           </a:xfrm>
           <a:prstGeom prst="rect">
@@ -24965,14 +25233,14 @@
           <p:nvPr>
             <p:extLst>
               <p:ext uri="{D42A27DB-BD31-4B8C-83A1-F6EECF244321}">
-                <p14:modId xmlns:p14="http://schemas.microsoft.com/office/powerpoint/2010/main" val="261502095"/>
+                <p14:modId xmlns:p14="http://schemas.microsoft.com/office/powerpoint/2010/main" val="3354701799"/>
               </p:ext>
             </p:extLst>
           </p:nvPr>
         </p:nvGraphicFramePr>
         <p:xfrm>
-          <a:off x="4024966" y="6959319"/>
-          <a:ext cx="2909234" cy="2413281"/>
+          <a:off x="3886200" y="6736314"/>
+          <a:ext cx="3200400" cy="2255286"/>
         </p:xfrm>
         <a:graphic>
           <a:graphicData uri="http://schemas.openxmlformats.org/drawingml/2006/table">
@@ -24981,8 +25249,8 @@
                 <a:tableStyleId>{00A15C55-8517-42AA-B614-E9B94910E393}</a:tableStyleId>
               </a:tblPr>
               <a:tblGrid>
-                <a:gridCol w="731388"/>
-                <a:gridCol w="2177846"/>
+                <a:gridCol w="870154"/>
+                <a:gridCol w="2330246"/>
               </a:tblGrid>
               <a:tr h="201351">
                 <a:tc>
@@ -25585,77 +25853,6 @@
                       <a:endParaRPr lang="en-US" sz="800" b="1" dirty="0" smtClean="0">
                         <a:solidFill>
                           <a:srgbClr val="F5944D"/>
-                        </a:solidFill>
-                      </a:endParaRPr>
-                    </a:p>
-                  </a:txBody>
-                  <a:tcPr marL="27432" marR="18288" marT="18288" marB="0"/>
-                </a:tc>
-              </a:tr>
-              <a:tr h="157995">
-                <a:tc>
-                  <a:txBody>
-                    <a:bodyPr/>
-                    <a:lstStyle/>
-                    <a:p>
-                      <a:r>
-                        <a:rPr lang="en-US" sz="800" b="1" dirty="0" err="1" smtClean="0">
-                          <a:solidFill>
-                            <a:srgbClr val="9CB95D"/>
-                          </a:solidFill>
-                        </a:rPr>
-                        <a:t>modbus</a:t>
-                      </a:r>
-                      <a:endParaRPr lang="en-US" sz="800" b="1" dirty="0">
-                        <a:solidFill>
-                          <a:srgbClr val="9CB95D"/>
-                        </a:solidFill>
-                      </a:endParaRPr>
-                    </a:p>
-                  </a:txBody>
-                  <a:tcPr marL="27432" marR="18288" marT="18288" marB="0"/>
-                </a:tc>
-                <a:tc>
-                  <a:txBody>
-                    <a:bodyPr/>
-                    <a:lstStyle/>
-                    <a:p>
-                      <a:pPr marL="0" marR="0" indent="0" algn="l" defTabSz="914400" rtl="0" eaLnBrk="1" fontAlgn="auto" latinLnBrk="0" hangingPunct="1">
-                        <a:lnSpc>
-                          <a:spcPct val="100000"/>
-                        </a:lnSpc>
-                        <a:spcBef>
-                          <a:spcPts val="0"/>
-                        </a:spcBef>
-                        <a:spcAft>
-                          <a:spcPts val="0"/>
-                        </a:spcAft>
-                        <a:buClrTx/>
-                        <a:buSzTx/>
-                        <a:buFontTx/>
-                        <a:buNone/>
-                        <a:tabLst/>
-                        <a:defRPr/>
-                      </a:pPr>
-                      <a:r>
-                        <a:rPr lang="en-US" sz="800" b="1" dirty="0" smtClean="0">
-                          <a:solidFill>
-                            <a:srgbClr val="9CB95D"/>
-                          </a:solidFill>
-                        </a:rPr>
-                        <a:t>PLC</a:t>
-                      </a:r>
-                      <a:r>
-                        <a:rPr lang="en-US" sz="800" b="1" baseline="0" dirty="0" smtClean="0">
-                          <a:solidFill>
-                            <a:srgbClr val="9CB95D"/>
-                          </a:solidFill>
-                        </a:rPr>
-                        <a:t> requests (industrial control)</a:t>
-                      </a:r>
-                      <a:endParaRPr lang="en-US" sz="800" b="1" dirty="0" smtClean="0">
-                        <a:solidFill>
-                          <a:srgbClr val="9CB95D"/>
                         </a:solidFill>
                       </a:endParaRPr>
                     </a:p>
@@ -25954,7 +26151,7 @@
         </p:nvSpPr>
         <p:spPr>
           <a:xfrm>
-            <a:off x="4939366" y="6654519"/>
+            <a:off x="4939366" y="6431514"/>
             <a:ext cx="1261884" cy="307777"/>
           </a:xfrm>
           <a:prstGeom prst="rect">
@@ -25980,15 +26177,6 @@
               </a:rPr>
               <a:t>Other Logs</a:t>
             </a:r>
-            <a:endParaRPr lang="en-US" sz="1400" dirty="0" smtClean="0">
-              <a:solidFill>
-                <a:schemeClr val="accent4">
-                  <a:lumMod val="60000"/>
-                  <a:lumOff val="40000"/>
-                </a:schemeClr>
-              </a:solidFill>
-              <a:latin typeface="Arial Black" pitchFamily="34" charset="0"/>
-            </a:endParaRPr>
           </a:p>
         </p:txBody>
       </p:sp>
@@ -26040,8 +26228,8 @@
         </p:nvSpPr>
         <p:spPr>
           <a:xfrm>
-            <a:off x="76200" y="8915400"/>
-            <a:ext cx="4038600" cy="461665"/>
+            <a:off x="36532" y="8991600"/>
+            <a:ext cx="7010400" cy="338554"/>
           </a:xfrm>
           <a:prstGeom prst="rect">
             <a:avLst/>
@@ -26054,17 +26242,17 @@
           <a:lstStyle/>
           <a:p>
             <a:r>
-              <a:rPr lang="en-US" sz="800" dirty="0">
+              <a:rPr lang="en-US" sz="800" dirty="0" smtClean="0">
                 <a:solidFill>
                   <a:schemeClr val="bg1">
                     <a:lumMod val="65000"/>
                   </a:schemeClr>
                 </a:solidFill>
               </a:rPr>
-              <a:t>This work is licensed under the Creative Commons Attribution-</a:t>
+              <a:t>In order to promote its wide distribution, this work is licensed under the Creative Commons Attribution-</a:t>
             </a:r>
             <a:r>
-              <a:rPr lang="en-US" sz="800" dirty="0" err="1">
+              <a:rPr lang="en-US" sz="800" dirty="0" err="1" smtClean="0">
                 <a:solidFill>
                   <a:schemeClr val="bg1">
                     <a:lumMod val="65000"/>
@@ -26101,7 +26289,7 @@
                   </a:schemeClr>
                 </a:solidFill>
               </a:rPr>
-              <a:t> </a:t>
+              <a:t> 4.0 </a:t>
             </a:r>
             <a:r>
               <a:rPr lang="en-US" sz="800" dirty="0">
@@ -26111,39 +26299,7 @@
                   </a:schemeClr>
                 </a:solidFill>
               </a:rPr>
-              <a:t>4.0 International License. To view a copy of this license, </a:t>
-            </a:r>
-            <a:r>
-              <a:rPr lang="en-US" sz="800" dirty="0" smtClean="0">
-                <a:solidFill>
-                  <a:schemeClr val="bg1">
-                    <a:lumMod val="65000"/>
-                  </a:schemeClr>
-                </a:solidFill>
-              </a:rPr>
-              <a:t>visit </a:t>
-            </a:r>
-          </a:p>
-          <a:p>
-            <a:r>
-              <a:rPr lang="en-US" sz="800" dirty="0" smtClean="0">
-                <a:solidFill>
-                  <a:schemeClr val="bg1">
-                    <a:lumMod val="65000"/>
-                  </a:schemeClr>
-                </a:solidFill>
-              </a:rPr>
-              <a:t>http</a:t>
-            </a:r>
-            <a:r>
-              <a:rPr lang="en-US" sz="800" dirty="0">
-                <a:solidFill>
-                  <a:schemeClr val="bg1">
-                    <a:lumMod val="65000"/>
-                  </a:schemeClr>
-                </a:solidFill>
-              </a:rPr>
-              <a:t>://</a:t>
+              <a:t>International License (http://</a:t>
             </a:r>
             <a:r>
               <a:rPr lang="en-US" sz="800" dirty="0" err="1">
@@ -26203,8 +26359,65 @@
                   </a:schemeClr>
                 </a:solidFill>
               </a:rPr>
-              <a:t>/4.0/</a:t>
+              <a:t>/4.0</a:t>
             </a:r>
+            <a:r>
+              <a:rPr lang="en-US" sz="800" dirty="0" smtClean="0">
+                <a:solidFill>
+                  <a:schemeClr val="bg1">
+                    <a:lumMod val="65000"/>
+                  </a:schemeClr>
+                </a:solidFill>
+              </a:rPr>
+              <a:t>/).</a:t>
+            </a:r>
+            <a:r>
+              <a:rPr lang="en-US" sz="800" dirty="0" smtClean="0">
+                <a:solidFill>
+                  <a:schemeClr val="bg1">
+                    <a:lumMod val="65000"/>
+                  </a:schemeClr>
+                </a:solidFill>
+              </a:rPr>
+              <a:t> </a:t>
+            </a:r>
+            <a:r>
+              <a:rPr lang="en-US" sz="800" dirty="0" smtClean="0">
+                <a:solidFill>
+                  <a:schemeClr val="bg1">
+                    <a:lumMod val="65000"/>
+                  </a:schemeClr>
+                </a:solidFill>
+              </a:rPr>
+              <a:t>We at </a:t>
+            </a:r>
+            <a:r>
+              <a:rPr lang="en-US" sz="800" dirty="0" err="1" smtClean="0">
+                <a:solidFill>
+                  <a:schemeClr val="bg1">
+                    <a:lumMod val="65000"/>
+                  </a:schemeClr>
+                </a:solidFill>
+              </a:rPr>
+              <a:t>Broala</a:t>
+            </a:r>
+            <a:r>
+              <a:rPr lang="en-US" sz="800" dirty="0" smtClean="0">
+                <a:solidFill>
+                  <a:schemeClr val="bg1">
+                    <a:lumMod val="65000"/>
+                  </a:schemeClr>
+                </a:solidFill>
+              </a:rPr>
+              <a:t> are committed to helping you understand  Bro to the fullest so you can be a monitoring hero.</a:t>
+            </a:r>
+            <a:endParaRPr lang="en-US" sz="800" dirty="0">
+              <a:solidFill>
+                <a:schemeClr val="bg1">
+                  <a:lumMod val="65000"/>
+                </a:schemeClr>
+              </a:solidFill>
+            </a:endParaRPr>
           </a:p>
         </p:txBody>
       </p:sp>
@@ -26217,34 +26430,34 @@
           <p:nvPr>
             <p:extLst>
               <p:ext uri="{D42A27DB-BD31-4B8C-83A1-F6EECF244321}">
-                <p14:modId xmlns:p14="http://schemas.microsoft.com/office/powerpoint/2010/main" val="3648538254"/>
+                <p14:modId xmlns:p14="http://schemas.microsoft.com/office/powerpoint/2010/main" val="690771699"/>
               </p:ext>
             </p:extLst>
           </p:nvPr>
         </p:nvGraphicFramePr>
         <p:xfrm>
-          <a:off x="3886199" y="851284"/>
-          <a:ext cx="3124201" cy="935286"/>
+          <a:off x="3886199" y="1000428"/>
+          <a:ext cx="3200400" cy="1087685"/>
         </p:xfrm>
         <a:graphic>
           <a:graphicData uri="http://schemas.openxmlformats.org/drawingml/2006/table">
             <a:tbl>
               <a:tblPr firstRow="1" bandRow="1">
-                <a:tableStyleId>{7DF18680-E054-41AD-8BC1-D1AEF772440D}</a:tableStyleId>
+                <a:tableStyleId>{93296810-A885-4BE3-A3E7-6D5BEEA58F35}</a:tableStyleId>
               </a:tblPr>
               <a:tblGrid>
-                <a:gridCol w="589846"/>
-                <a:gridCol w="332362"/>
-                <a:gridCol w="2201993"/>
+                <a:gridCol w="604232"/>
+                <a:gridCol w="340468"/>
+                <a:gridCol w="2255700"/>
               </a:tblGrid>
-              <a:tr h="201351">
-                <a:tc>
-                  <a:txBody>
-                    <a:bodyPr/>
-                    <a:lstStyle/>
-                    <a:p>
-                      <a:r>
-                        <a:rPr lang="en-US" sz="1000" b="1" dirty="0" smtClean="0"/>
+              <a:tr h="234160">
+                <a:tc>
+                  <a:txBody>
+                    <a:bodyPr/>
+                    <a:lstStyle/>
+                    <a:p>
+                      <a:r>
+                        <a:rPr lang="en-US" sz="1000" dirty="0" smtClean="0"/>
                         <a:t>Field</a:t>
                       </a:r>
                       <a:endParaRPr lang="en-US" sz="1000" b="1" dirty="0"/>
@@ -26258,7 +26471,7 @@
                     <a:lstStyle/>
                     <a:p>
                       <a:r>
-                        <a:rPr lang="en-US" sz="1000" b="1" dirty="0" smtClean="0"/>
+                        <a:rPr lang="en-US" sz="1000" dirty="0" smtClean="0"/>
                         <a:t>Type</a:t>
                       </a:r>
                       <a:endParaRPr lang="en-US" sz="1000" b="1" dirty="0"/>
@@ -26281,14 +26494,14 @@
                   <a:tcPr marL="27432" marR="18288" marT="18288" marB="0"/>
                 </a:tc>
               </a:tr>
-              <a:tr h="157269">
-                <a:tc>
-                  <a:txBody>
-                    <a:bodyPr/>
-                    <a:lstStyle/>
-                    <a:p>
-                      <a:r>
-                        <a:rPr lang="en-US" sz="800" b="1" dirty="0" err="1" smtClean="0"/>
+              <a:tr h="182895">
+                <a:tc>
+                  <a:txBody>
+                    <a:bodyPr/>
+                    <a:lstStyle/>
+                    <a:p>
+                      <a:r>
+                        <a:rPr lang="en-US" sz="800" dirty="0" err="1" smtClean="0"/>
                         <a:t>ts</a:t>
                       </a:r>
                       <a:endParaRPr lang="en-US" sz="800" b="1" dirty="0"/>
@@ -26302,11 +26515,7 @@
                     <a:lstStyle/>
                     <a:p>
                       <a:r>
-                        <a:rPr lang="en-US" sz="800" b="0" dirty="0" smtClean="0">
-                          <a:solidFill>
-                            <a:schemeClr val="tx1"/>
-                          </a:solidFill>
-                        </a:rPr>
+                        <a:rPr lang="en-US" sz="800" dirty="0" smtClean="0"/>
                         <a:t>time</a:t>
                       </a:r>
                       <a:endParaRPr lang="en-US" sz="800" b="0" dirty="0">
@@ -26324,11 +26533,7 @@
                     <a:lstStyle/>
                     <a:p>
                       <a:r>
-                        <a:rPr lang="en-US" sz="800" b="0" dirty="0" smtClean="0">
-                          <a:solidFill>
-                            <a:schemeClr val="tx1"/>
-                          </a:solidFill>
-                        </a:rPr>
+                        <a:rPr lang="en-US" sz="800" dirty="0" smtClean="0"/>
                         <a:t>Message timestamp, if available (0 otherwise)</a:t>
                       </a:r>
                       <a:endParaRPr lang="en-US" sz="800" b="0" dirty="0">
@@ -26341,14 +26546,14 @@
                   <a:tcPr marL="27432" marR="18288" marT="18288" marB="0"/>
                 </a:tc>
               </a:tr>
-              <a:tr h="157269">
-                <a:tc>
-                  <a:txBody>
-                    <a:bodyPr/>
-                    <a:lstStyle/>
-                    <a:p>
-                      <a:r>
-                        <a:rPr lang="en-US" sz="800" b="1" dirty="0" smtClean="0"/>
+              <a:tr h="182895">
+                <a:tc>
+                  <a:txBody>
+                    <a:bodyPr/>
+                    <a:lstStyle/>
+                    <a:p>
+                      <a:r>
+                        <a:rPr lang="en-US" sz="800" dirty="0" smtClean="0"/>
                         <a:t>level</a:t>
                       </a:r>
                       <a:endParaRPr lang="en-US" sz="800" b="1" dirty="0"/>
@@ -26362,11 +26567,7 @@
                     <a:lstStyle/>
                     <a:p>
                       <a:r>
-                        <a:rPr lang="en-US" sz="800" b="0" dirty="0" smtClean="0">
-                          <a:solidFill>
-                            <a:schemeClr val="tx1"/>
-                          </a:solidFill>
-                        </a:rPr>
+                        <a:rPr lang="en-US" sz="800" dirty="0" smtClean="0"/>
                         <a:t>string</a:t>
                       </a:r>
                       <a:endParaRPr lang="en-US" sz="800" b="0" dirty="0">
@@ -26397,14 +26598,14 @@
                   <a:tcPr marL="27432" marR="18288" marT="18288" marB="0"/>
                 </a:tc>
               </a:tr>
-              <a:tr h="157269">
-                <a:tc>
-                  <a:txBody>
-                    <a:bodyPr/>
-                    <a:lstStyle/>
-                    <a:p>
-                      <a:r>
-                        <a:rPr lang="en-US" sz="800" b="1" dirty="0" smtClean="0"/>
+              <a:tr h="182895">
+                <a:tc>
+                  <a:txBody>
+                    <a:bodyPr/>
+                    <a:lstStyle/>
+                    <a:p>
+                      <a:r>
+                        <a:rPr lang="en-US" sz="800" dirty="0" smtClean="0"/>
                         <a:t>message</a:t>
                       </a:r>
                       <a:endParaRPr lang="en-US" sz="800" b="1" dirty="0"/>
@@ -26418,11 +26619,7 @@
                     <a:lstStyle/>
                     <a:p>
                       <a:r>
-                        <a:rPr lang="en-US" sz="800" b="0" dirty="0" smtClean="0">
-                          <a:solidFill>
-                            <a:schemeClr val="tx1"/>
-                          </a:solidFill>
-                        </a:rPr>
+                        <a:rPr lang="en-US" sz="800" dirty="0" smtClean="0"/>
                         <a:t>string</a:t>
                       </a:r>
                       <a:endParaRPr lang="en-US" sz="800" b="0" dirty="0">
@@ -26470,14 +26667,14 @@
                   <a:tcPr marL="27432" marR="18288" marT="18288" marB="0"/>
                 </a:tc>
               </a:tr>
-              <a:tr h="157269">
-                <a:tc>
-                  <a:txBody>
-                    <a:bodyPr/>
-                    <a:lstStyle/>
-                    <a:p>
-                      <a:r>
-                        <a:rPr lang="en-US" sz="800" b="1" dirty="0" smtClean="0"/>
+              <a:tr h="304840">
+                <a:tc>
+                  <a:txBody>
+                    <a:bodyPr/>
+                    <a:lstStyle/>
+                    <a:p>
+                      <a:r>
+                        <a:rPr lang="en-US" sz="800" dirty="0" smtClean="0"/>
                         <a:t>location</a:t>
                       </a:r>
                       <a:endParaRPr lang="en-US" sz="800" b="1" dirty="0"/>
@@ -26491,11 +26688,7 @@
                     <a:lstStyle/>
                     <a:p>
                       <a:r>
-                        <a:rPr lang="en-US" sz="800" b="0" dirty="0" smtClean="0">
-                          <a:solidFill>
-                            <a:schemeClr val="tx1"/>
-                          </a:solidFill>
-                        </a:rPr>
+                        <a:rPr lang="en-US" sz="800" dirty="0" smtClean="0"/>
                         <a:t>string</a:t>
                       </a:r>
                       <a:endParaRPr lang="en-US" sz="800" b="0" dirty="0">
@@ -26513,19 +26706,11 @@
                     <a:lstStyle/>
                     <a:p>
                       <a:r>
-                        <a:rPr lang="en-US" sz="800" b="0" dirty="0" smtClean="0">
-                          <a:solidFill>
-                            <a:schemeClr val="tx1"/>
-                          </a:solidFill>
-                        </a:rPr>
+                        <a:rPr lang="en-US" sz="800" dirty="0" smtClean="0"/>
                         <a:t>The</a:t>
                       </a:r>
                       <a:r>
-                        <a:rPr lang="en-US" sz="800" b="0" baseline="0" dirty="0" smtClean="0">
-                          <a:solidFill>
-                            <a:schemeClr val="tx1"/>
-                          </a:solidFill>
-                        </a:rPr>
+                        <a:rPr lang="en-US" sz="800" baseline="0" dirty="0" smtClean="0"/>
                         <a:t> script location where the event occurred, if available</a:t>
                       </a:r>
                       <a:endParaRPr lang="en-US" sz="800" b="0" dirty="0">
@@ -26550,7 +26735,7 @@
         </p:nvSpPr>
         <p:spPr>
           <a:xfrm>
-            <a:off x="3800364" y="381000"/>
+            <a:off x="3800364" y="530144"/>
             <a:ext cx="2481281" cy="461665"/>
           </a:xfrm>
           <a:prstGeom prst="rect">
@@ -26567,33 +26752,15 @@
             <a:r>
               <a:rPr lang="en-US" sz="1400" dirty="0" err="1" smtClean="0">
                 <a:solidFill>
-                  <a:schemeClr val="accent5">
-                    <a:lumMod val="60000"/>
-                    <a:lumOff val="40000"/>
-                  </a:schemeClr>
+                  <a:srgbClr val="F6B484"/>
                 </a:solidFill>
                 <a:latin typeface="Arial Black" pitchFamily="34" charset="0"/>
               </a:rPr>
-              <a:t>reporter</a:t>
-            </a:r>
-            <a:r>
-              <a:rPr lang="en-US" sz="1400" dirty="0" err="1" smtClean="0">
-                <a:solidFill>
-                  <a:schemeClr val="accent5">
-                    <a:lumMod val="60000"/>
-                    <a:lumOff val="40000"/>
-                  </a:schemeClr>
-                </a:solidFill>
-                <a:latin typeface="Arial Black" pitchFamily="34" charset="0"/>
-              </a:rPr>
-              <a:t>.log</a:t>
+              <a:t>reporter.log</a:t>
             </a:r>
             <a:endParaRPr lang="en-US" sz="1400" dirty="0" smtClean="0">
               <a:solidFill>
-                <a:schemeClr val="accent5">
-                  <a:lumMod val="60000"/>
-                  <a:lumOff val="40000"/>
-                </a:schemeClr>
+                <a:srgbClr val="F6B484"/>
               </a:solidFill>
               <a:latin typeface="Arial Black" pitchFamily="34" charset="0"/>
             </a:endParaRPr>
@@ -26602,10 +26769,7 @@
             <a:r>
               <a:rPr lang="en-US" sz="1000" dirty="0" smtClean="0">
                 <a:solidFill>
-                  <a:schemeClr val="accent5">
-                    <a:lumMod val="60000"/>
-                    <a:lumOff val="40000"/>
-                  </a:schemeClr>
+                  <a:srgbClr val="F6B484"/>
                 </a:solidFill>
                 <a:latin typeface="Arial Black" pitchFamily="34" charset="0"/>
               </a:rPr>
@@ -26613,10 +26777,7 @@
             </a:r>
             <a:endParaRPr lang="en-US" sz="1000" dirty="0">
               <a:solidFill>
-                <a:schemeClr val="accent5">
-                  <a:lumMod val="60000"/>
-                  <a:lumOff val="40000"/>
-                </a:schemeClr>
+                <a:srgbClr val="F6B484"/>
               </a:solidFill>
               <a:latin typeface="Arial Black" pitchFamily="34" charset="0"/>
             </a:endParaRPr>

</xml_diff>